<commit_message>
:fire:, :pencil:, :books: :camera: :hammer: Word write-ups, Updates
</commit_message>
<xml_diff>
--- a/MY PRESENTATION.pptx
+++ b/MY PRESENTATION.pptx
@@ -5,23 +5,24 @@
     <p:sldMasterId id="2147483652" r:id="rId1"/>
   </p:sldMasterIdLst>
   <p:notesMasterIdLst>
-    <p:notesMasterId r:id="rId13"/>
+    <p:notesMasterId r:id="rId14"/>
   </p:notesMasterIdLst>
   <p:handoutMasterIdLst>
-    <p:handoutMasterId r:id="rId14"/>
+    <p:handoutMasterId r:id="rId15"/>
   </p:handoutMasterIdLst>
   <p:sldIdLst>
     <p:sldId id="325" r:id="rId2"/>
     <p:sldId id="330" r:id="rId3"/>
-    <p:sldId id="331" r:id="rId4"/>
-    <p:sldId id="332" r:id="rId5"/>
-    <p:sldId id="333" r:id="rId6"/>
-    <p:sldId id="351" r:id="rId7"/>
-    <p:sldId id="352" r:id="rId8"/>
-    <p:sldId id="334" r:id="rId9"/>
-    <p:sldId id="335" r:id="rId10"/>
-    <p:sldId id="353" r:id="rId11"/>
-    <p:sldId id="324" r:id="rId12"/>
+    <p:sldId id="356" r:id="rId4"/>
+    <p:sldId id="331" r:id="rId5"/>
+    <p:sldId id="332" r:id="rId6"/>
+    <p:sldId id="333" r:id="rId7"/>
+    <p:sldId id="355" r:id="rId8"/>
+    <p:sldId id="354" r:id="rId9"/>
+    <p:sldId id="334" r:id="rId10"/>
+    <p:sldId id="335" r:id="rId11"/>
+    <p:sldId id="353" r:id="rId12"/>
+    <p:sldId id="324" r:id="rId13"/>
   </p:sldIdLst>
   <p:sldSz cx="9144000" cy="6858000" type="screen4x3"/>
   <p:notesSz cx="6858000" cy="9947275"/>
@@ -2437,7 +2438,7 @@
               <a:pPr>
                 <a:defRPr/>
               </a:pPr>
-              <a:t>8</a:t>
+              <a:t>9</a:t>
             </a:fld>
             <a:endParaRPr lang="en-GB"/>
           </a:p>
@@ -7987,7 +7988,13 @@
       </p:grpSpPr>
       <p:sp>
         <p:nvSpPr>
-          <p:cNvPr id="2" name="Text Placeholder 1"/>
+          <p:cNvPr id="2" name="Text Placeholder 1">
+            <a:extLst>
+              <a:ext uri="{FF2B5EF4-FFF2-40B4-BE49-F238E27FC236}">
+                <a16:creationId xmlns:a16="http://schemas.microsoft.com/office/drawing/2014/main" id="{327FB035-4EC4-45C3-8B2F-AED423F29F13}"/>
+              </a:ext>
+            </a:extLst>
+          </p:cNvPr>
           <p:cNvSpPr>
             <a:spLocks noGrp="1"/>
           </p:cNvSpPr>
@@ -8000,13 +8007,278 @@
           <a:bodyPr/>
           <a:lstStyle/>
           <a:p>
-            <a:endParaRPr lang="en-US" dirty="0"/>
-          </a:p>
-        </p:txBody>
-      </p:sp>
-      <p:sp>
-        <p:nvSpPr>
-          <p:cNvPr id="3" name="Footer Placeholder 2"/>
+            <a:pPr marL="514350" marR="0" lvl="0" indent="-514350" fontAlgn="base">
+              <a:lnSpc>
+                <a:spcPct val="107000"/>
+              </a:lnSpc>
+              <a:spcBef>
+                <a:spcPts val="0"/>
+              </a:spcBef>
+              <a:spcAft>
+                <a:spcPts val="0"/>
+              </a:spcAft>
+              <a:buSzPts val="1000"/>
+              <a:buFont typeface="+mj-lt"/>
+              <a:buAutoNum type="romanUcPeriod"/>
+              <a:tabLst>
+                <a:tab pos="457200" algn="l"/>
+              </a:tabLst>
+            </a:pPr>
+            <a:r>
+              <a:rPr lang="en-GB" b="0" dirty="0">
+                <a:solidFill>
+                  <a:srgbClr val="000000"/>
+                </a:solidFill>
+                <a:effectLst/>
+                <a:cs typeface="Times New Roman" panose="02020603050405020304" pitchFamily="18" charset="0"/>
+              </a:rPr>
+              <a:t>Chlorophyl-a Geographical Maps associating the occurrence of the Harmful Algal Blooms and Cyanobacteria.</a:t>
+            </a:r>
+          </a:p>
+          <a:p>
+            <a:pPr marL="514350" marR="0" lvl="0" indent="-514350" fontAlgn="base">
+              <a:lnSpc>
+                <a:spcPct val="107000"/>
+              </a:lnSpc>
+              <a:spcBef>
+                <a:spcPts val="0"/>
+              </a:spcBef>
+              <a:spcAft>
+                <a:spcPts val="0"/>
+              </a:spcAft>
+              <a:buSzPts val="1000"/>
+              <a:buFont typeface="+mj-lt"/>
+              <a:buAutoNum type="romanUcPeriod"/>
+              <a:tabLst>
+                <a:tab pos="457200" algn="l"/>
+              </a:tabLst>
+            </a:pPr>
+            <a:endParaRPr lang="en-GB" b="0" dirty="0">
+              <a:solidFill>
+                <a:srgbClr val="000000"/>
+              </a:solidFill>
+              <a:effectLst/>
+              <a:cs typeface="Times New Roman" panose="02020603050405020304" pitchFamily="18" charset="0"/>
+            </a:endParaRPr>
+          </a:p>
+          <a:p>
+            <a:pPr marL="514350" marR="0" lvl="0" indent="-514350" fontAlgn="base">
+              <a:lnSpc>
+                <a:spcPct val="107000"/>
+              </a:lnSpc>
+              <a:spcBef>
+                <a:spcPts val="0"/>
+              </a:spcBef>
+              <a:spcAft>
+                <a:spcPts val="0"/>
+              </a:spcAft>
+              <a:buSzPts val="1000"/>
+              <a:buFont typeface="+mj-lt"/>
+              <a:buAutoNum type="romanUcPeriod"/>
+              <a:tabLst>
+                <a:tab pos="457200" algn="l"/>
+              </a:tabLst>
+            </a:pPr>
+            <a:r>
+              <a:rPr lang="en-GB" b="0" dirty="0">
+                <a:solidFill>
+                  <a:srgbClr val="000000"/>
+                </a:solidFill>
+                <a:effectLst/>
+                <a:cs typeface="Times New Roman" panose="02020603050405020304" pitchFamily="18" charset="0"/>
+              </a:rPr>
+              <a:t>Automated system that monitors and reports geo-tagged data</a:t>
+            </a:r>
+          </a:p>
+          <a:p>
+            <a:pPr marL="514350" marR="0" lvl="0" indent="-514350" fontAlgn="base">
+              <a:lnSpc>
+                <a:spcPct val="107000"/>
+              </a:lnSpc>
+              <a:spcBef>
+                <a:spcPts val="0"/>
+              </a:spcBef>
+              <a:spcAft>
+                <a:spcPts val="0"/>
+              </a:spcAft>
+              <a:buSzPts val="1000"/>
+              <a:buFont typeface="+mj-lt"/>
+              <a:buAutoNum type="romanUcPeriod"/>
+              <a:tabLst>
+                <a:tab pos="457200" algn="l"/>
+              </a:tabLst>
+            </a:pPr>
+            <a:endParaRPr lang="en-US" b="0" dirty="0">
+              <a:solidFill>
+                <a:srgbClr val="000000"/>
+              </a:solidFill>
+              <a:effectLst/>
+            </a:endParaRPr>
+          </a:p>
+          <a:p>
+            <a:pPr marL="514350" marR="0" lvl="0" indent="-514350" fontAlgn="base">
+              <a:lnSpc>
+                <a:spcPct val="107000"/>
+              </a:lnSpc>
+              <a:spcBef>
+                <a:spcPts val="0"/>
+              </a:spcBef>
+              <a:spcAft>
+                <a:spcPts val="0"/>
+              </a:spcAft>
+              <a:buSzPts val="1000"/>
+              <a:buFont typeface="+mj-lt"/>
+              <a:buAutoNum type="romanUcPeriod"/>
+              <a:tabLst>
+                <a:tab pos="457200" algn="l"/>
+              </a:tabLst>
+            </a:pPr>
+            <a:r>
+              <a:rPr lang="en-GB" b="0" dirty="0">
+                <a:solidFill>
+                  <a:srgbClr val="000000"/>
+                </a:solidFill>
+                <a:effectLst/>
+                <a:cs typeface="Times New Roman" panose="02020603050405020304" pitchFamily="18" charset="0"/>
+              </a:rPr>
+              <a:t>Reported confirmation alert Text SMS reporting in near-real time the </a:t>
+            </a:r>
+            <a:r>
+              <a:rPr lang="en-GB" b="0" i="1" dirty="0">
+                <a:solidFill>
+                  <a:srgbClr val="000000"/>
+                </a:solidFill>
+                <a:effectLst/>
+                <a:cs typeface="Times New Roman" panose="02020603050405020304" pitchFamily="18" charset="0"/>
+              </a:rPr>
+              <a:t>in-situ </a:t>
+            </a:r>
+            <a:r>
+              <a:rPr lang="en-GB" b="0" dirty="0">
+                <a:solidFill>
+                  <a:srgbClr val="000000"/>
+                </a:solidFill>
+                <a:effectLst/>
+                <a:cs typeface="Times New Roman" panose="02020603050405020304" pitchFamily="18" charset="0"/>
+              </a:rPr>
+              <a:t>status from the sensors.</a:t>
+            </a:r>
+          </a:p>
+          <a:p>
+            <a:pPr marL="514350" marR="0" lvl="0" indent="-514350" fontAlgn="base">
+              <a:lnSpc>
+                <a:spcPct val="107000"/>
+              </a:lnSpc>
+              <a:spcBef>
+                <a:spcPts val="0"/>
+              </a:spcBef>
+              <a:spcAft>
+                <a:spcPts val="0"/>
+              </a:spcAft>
+              <a:buSzPts val="1000"/>
+              <a:buFont typeface="+mj-lt"/>
+              <a:buAutoNum type="romanUcPeriod"/>
+              <a:tabLst>
+                <a:tab pos="457200" algn="l"/>
+              </a:tabLst>
+            </a:pPr>
+            <a:endParaRPr lang="en-GB" b="0" dirty="0">
+              <a:solidFill>
+                <a:srgbClr val="000000"/>
+              </a:solidFill>
+              <a:cs typeface="Times New Roman" panose="02020603050405020304" pitchFamily="18" charset="0"/>
+            </a:endParaRPr>
+          </a:p>
+          <a:p>
+            <a:pPr marL="514350" marR="0" lvl="0" indent="-514350" fontAlgn="base">
+              <a:lnSpc>
+                <a:spcPct val="107000"/>
+              </a:lnSpc>
+              <a:spcBef>
+                <a:spcPts val="0"/>
+              </a:spcBef>
+              <a:spcAft>
+                <a:spcPts val="0"/>
+              </a:spcAft>
+              <a:buSzPts val="1000"/>
+              <a:buFont typeface="+mj-lt"/>
+              <a:buAutoNum type="romanUcPeriod"/>
+              <a:tabLst>
+                <a:tab pos="457200" algn="l"/>
+              </a:tabLst>
+            </a:pPr>
+            <a:r>
+              <a:rPr lang="en-GB" b="0" dirty="0">
+                <a:solidFill>
+                  <a:srgbClr val="000000"/>
+                </a:solidFill>
+                <a:effectLst/>
+                <a:cs typeface="Times New Roman" panose="02020603050405020304" pitchFamily="18" charset="0"/>
+              </a:rPr>
+              <a:t>Time Series predictive model on any looming bloom.</a:t>
+            </a:r>
+          </a:p>
+          <a:p>
+            <a:pPr marL="514350" marR="0" lvl="0" indent="-514350" fontAlgn="base">
+              <a:lnSpc>
+                <a:spcPct val="107000"/>
+              </a:lnSpc>
+              <a:spcBef>
+                <a:spcPts val="0"/>
+              </a:spcBef>
+              <a:spcAft>
+                <a:spcPts val="0"/>
+              </a:spcAft>
+              <a:buSzPts val="1000"/>
+              <a:buFont typeface="+mj-lt"/>
+              <a:buAutoNum type="romanUcPeriod"/>
+              <a:tabLst>
+                <a:tab pos="457200" algn="l"/>
+              </a:tabLst>
+            </a:pPr>
+            <a:endParaRPr lang="en-US" b="0" dirty="0">
+              <a:solidFill>
+                <a:srgbClr val="000000"/>
+              </a:solidFill>
+              <a:effectLst/>
+            </a:endParaRPr>
+          </a:p>
+          <a:p>
+            <a:pPr marL="0" marR="0" lvl="0" indent="0" fontAlgn="base">
+              <a:lnSpc>
+                <a:spcPct val="107000"/>
+              </a:lnSpc>
+              <a:spcBef>
+                <a:spcPts val="0"/>
+              </a:spcBef>
+              <a:spcAft>
+                <a:spcPts val="0"/>
+              </a:spcAft>
+              <a:buSzPts val="1000"/>
+              <a:tabLst>
+                <a:tab pos="457200" algn="l"/>
+              </a:tabLst>
+            </a:pPr>
+            <a:endParaRPr lang="en-US" sz="1800" b="0" dirty="0">
+              <a:solidFill>
+                <a:srgbClr val="000000"/>
+              </a:solidFill>
+              <a:effectLst/>
+              <a:latin typeface="Calibri" panose="020F0502020204030204" pitchFamily="34" charset="0"/>
+              <a:ea typeface="Calibri" panose="020F0502020204030204" pitchFamily="34" charset="0"/>
+            </a:endParaRPr>
+          </a:p>
+        </p:txBody>
+      </p:sp>
+      <p:sp>
+        <p:nvSpPr>
+          <p:cNvPr id="3" name="Footer Placeholder 2">
+            <a:extLst>
+              <a:ext uri="{FF2B5EF4-FFF2-40B4-BE49-F238E27FC236}">
+                <a16:creationId xmlns:a16="http://schemas.microsoft.com/office/drawing/2014/main" id="{5D13DC20-297E-417D-8DFC-DC2FCABB764B}"/>
+              </a:ext>
+            </a:extLst>
+          </p:cNvPr>
           <p:cNvSpPr>
             <a:spLocks noGrp="1"/>
           </p:cNvSpPr>
@@ -8034,7 +8306,13 @@
       </p:sp>
       <p:sp>
         <p:nvSpPr>
-          <p:cNvPr id="4" name="Title 3"/>
+          <p:cNvPr id="4" name="Title 3">
+            <a:extLst>
+              <a:ext uri="{FF2B5EF4-FFF2-40B4-BE49-F238E27FC236}">
+                <a16:creationId xmlns:a16="http://schemas.microsoft.com/office/drawing/2014/main" id="{5EDBB8AF-905E-406C-B321-B53DDA2D2878}"/>
+              </a:ext>
+            </a:extLst>
+          </p:cNvPr>
           <p:cNvSpPr>
             <a:spLocks noGrp="1"/>
           </p:cNvSpPr>
@@ -8049,11 +8327,127 @@
           <a:p>
             <a:r>
               <a:rPr lang="en-US" dirty="0"/>
+              <a:t>Expected Results</a:t>
+            </a:r>
+          </a:p>
+        </p:txBody>
+      </p:sp>
+    </p:spTree>
+    <p:extLst>
+      <p:ext uri="{BB962C8B-B14F-4D97-AF65-F5344CB8AC3E}">
+        <p14:creationId xmlns:p14="http://schemas.microsoft.com/office/powerpoint/2010/main" val="136174935"/>
+      </p:ext>
+    </p:extLst>
+  </p:cSld>
+  <p:clrMapOvr>
+    <a:masterClrMapping/>
+  </p:clrMapOvr>
+</p:sld>
+</file>
+
+<file path=ppt/slides/slide11.xml><?xml version="1.0" encoding="utf-8"?>
+<p:sld xmlns:a="http://schemas.openxmlformats.org/drawingml/2006/main" xmlns:r="http://schemas.openxmlformats.org/officeDocument/2006/relationships" xmlns:p="http://schemas.openxmlformats.org/presentationml/2006/main">
+  <p:cSld>
+    <p:spTree>
+      <p:nvGrpSpPr>
+        <p:cNvPr id="1" name=""/>
+        <p:cNvGrpSpPr/>
+        <p:nvPr/>
+      </p:nvGrpSpPr>
+      <p:grpSpPr>
+        <a:xfrm>
+          <a:off x="0" y="0"/>
+          <a:ext cx="0" cy="0"/>
+          <a:chOff x="0" y="0"/>
+          <a:chExt cx="0" cy="0"/>
+        </a:xfrm>
+      </p:grpSpPr>
+      <p:sp>
+        <p:nvSpPr>
+          <p:cNvPr id="3" name="Footer Placeholder 2"/>
+          <p:cNvSpPr>
+            <a:spLocks noGrp="1"/>
+          </p:cNvSpPr>
+          <p:nvPr>
+            <p:ph type="ftr" sz="quarter" idx="10"/>
+          </p:nvPr>
+        </p:nvSpPr>
+        <p:spPr/>
+        <p:txBody>
+          <a:bodyPr/>
+          <a:lstStyle/>
+          <a:p>
+            <a:pPr>
+              <a:defRPr/>
+            </a:pPr>
+            <a:endParaRPr lang="de-DE"/>
+          </a:p>
+          <a:p>
+            <a:pPr>
+              <a:defRPr/>
+            </a:pPr>
+            <a:endParaRPr lang="de-DE"/>
+          </a:p>
+        </p:txBody>
+      </p:sp>
+      <p:sp>
+        <p:nvSpPr>
+          <p:cNvPr id="4" name="Title 3"/>
+          <p:cNvSpPr>
+            <a:spLocks noGrp="1"/>
+          </p:cNvSpPr>
+          <p:nvPr>
+            <p:ph type="title"/>
+          </p:nvPr>
+        </p:nvSpPr>
+        <p:spPr/>
+        <p:txBody>
+          <a:bodyPr/>
+          <a:lstStyle/>
+          <a:p>
+            <a:r>
+              <a:rPr lang="en-US" dirty="0"/>
               <a:t>Project Timeline</a:t>
             </a:r>
           </a:p>
         </p:txBody>
       </p:sp>
+      <p:pic>
+        <p:nvPicPr>
+          <p:cNvPr id="6" name="Picture 5">
+            <a:extLst>
+              <a:ext uri="{FF2B5EF4-FFF2-40B4-BE49-F238E27FC236}">
+                <a16:creationId xmlns:a16="http://schemas.microsoft.com/office/drawing/2014/main" id="{5B6F07F2-51C9-4E12-8283-E9988374FE9B}"/>
+              </a:ext>
+            </a:extLst>
+          </p:cNvPr>
+          <p:cNvPicPr>
+            <a:picLocks noChangeAspect="1"/>
+          </p:cNvPicPr>
+          <p:nvPr/>
+        </p:nvPicPr>
+        <p:blipFill>
+          <a:blip r:embed="rId2">
+            <a:extLst>
+              <a:ext uri="{28A0092B-C50C-407E-A947-70E740481C1C}">
+                <a14:useLocalDpi xmlns:a14="http://schemas.microsoft.com/office/drawing/2010/main" val="0"/>
+              </a:ext>
+            </a:extLst>
+          </a:blip>
+          <a:stretch>
+            <a:fillRect/>
+          </a:stretch>
+        </p:blipFill>
+        <p:spPr>
+          <a:xfrm>
+            <a:off x="243456" y="1554115"/>
+            <a:ext cx="8568952" cy="4814935"/>
+          </a:xfrm>
+          <a:prstGeom prst="rect">
+            <a:avLst/>
+          </a:prstGeom>
+        </p:spPr>
+      </p:pic>
     </p:spTree>
     <p:extLst>
       <p:ext uri="{BB962C8B-B14F-4D97-AF65-F5344CB8AC3E}">
@@ -8067,7 +8461,7 @@
 </p:sld>
 </file>
 
-<file path=ppt/slides/slide11.xml><?xml version="1.0" encoding="utf-8"?>
+<file path=ppt/slides/slide12.xml><?xml version="1.0" encoding="utf-8"?>
 <p:sld xmlns:a="http://schemas.openxmlformats.org/drawingml/2006/main" xmlns:r="http://schemas.openxmlformats.org/officeDocument/2006/relationships" xmlns:p="http://schemas.openxmlformats.org/presentationml/2006/main">
   <p:cSld>
     <p:spTree>
@@ -8386,7 +8780,7 @@
             </a:pPr>
             <a:r>
               <a:rPr lang="en-GB" sz="2200" b="0" dirty="0"/>
-              <a:t>Move 1 establish your territory (say what the topic is about)</a:t>
+              <a:t>Topic is about</a:t>
             </a:r>
           </a:p>
           <a:p>
@@ -8396,7 +8790,7 @@
             </a:pPr>
             <a:r>
               <a:rPr lang="en-GB" sz="2200" b="0" dirty="0"/>
-              <a:t>Move 2 establish a niche (show why there needs to be further research on your topic)</a:t>
+              <a:t>Support the Title</a:t>
             </a:r>
           </a:p>
           <a:p>
@@ -8406,17 +8800,7 @@
             </a:pPr>
             <a:r>
               <a:rPr lang="en-GB" sz="2200" b="0" dirty="0"/>
-              <a:t>Move 3 introduce the current research (make hypotheses; state the research questions)</a:t>
-            </a:r>
-          </a:p>
-          <a:p>
-            <a:pPr marL="342900" lvl="0" indent="-342900">
-              <a:buFont typeface="Arial" panose="020B0604020202020204" pitchFamily="34" charset="0"/>
-              <a:buChar char="•"/>
-            </a:pPr>
-            <a:r>
-              <a:rPr lang="en-GB" sz="2200" b="0" dirty="0"/>
-              <a:t>Start globally &gt; regionally &gt; nationally &gt; locally outline the issue at hand. </a:t>
+              <a:t>Why there’s need for this research</a:t>
             </a:r>
           </a:p>
           <a:p>
@@ -8541,7 +8925,7 @@
           <p:cNvPr id="2" name="Text Placeholder 1">
             <a:extLst>
               <a:ext uri="{FF2B5EF4-FFF2-40B4-BE49-F238E27FC236}">
-                <a16:creationId xmlns:a16="http://schemas.microsoft.com/office/drawing/2014/main" id="{C6BC2DDB-B407-4770-B67A-A85A9B1A8568}"/>
+                <a16:creationId xmlns:a16="http://schemas.microsoft.com/office/drawing/2014/main" id="{C68A5470-9702-47CF-8379-7842B2A3E04E}"/>
               </a:ext>
             </a:extLst>
           </p:cNvPr>
@@ -8563,9 +8947,8 @@
             </a:pPr>
             <a:r>
               <a:rPr lang="en-GB" sz="2200" b="0" dirty="0"/>
-              <a:t>By now you’ve identified gaps in the past studies</a:t>
-            </a:r>
-            <a:endParaRPr lang="en-US" sz="2200" b="0" dirty="0"/>
+              <a:t>Move 1 establish your territory (say what the topic is about)</a:t>
+            </a:r>
           </a:p>
           <a:p>
             <a:pPr marL="342900" lvl="0" indent="-342900">
@@ -8574,9 +8957,8 @@
             </a:pPr>
             <a:r>
               <a:rPr lang="en-GB" sz="2200" b="0" dirty="0"/>
-              <a:t>Clearly outline it here </a:t>
-            </a:r>
-            <a:endParaRPr lang="en-US" sz="2200" b="0" dirty="0"/>
+              <a:t>Move 2 establish a niche (show why there needs to be further research on your topic)</a:t>
+            </a:r>
           </a:p>
           <a:p>
             <a:pPr marL="342900" lvl="0" indent="-342900">
@@ -8585,9 +8967,8 @@
             </a:pPr>
             <a:r>
               <a:rPr lang="en-GB" sz="2200" b="0" dirty="0"/>
-              <a:t>After reviewing the papers and gaps – what exactly is the problem? state this explicitly.</a:t>
-            </a:r>
-            <a:endParaRPr lang="en-US" sz="2200" b="0" dirty="0"/>
+              <a:t>Move 3 introduce the current research (make hypotheses; state the research questions)</a:t>
+            </a:r>
           </a:p>
           <a:p>
             <a:pPr marL="342900" lvl="0" indent="-342900">
@@ -8596,9 +8977,28 @@
             </a:pPr>
             <a:r>
               <a:rPr lang="en-GB" sz="2200" b="0" dirty="0"/>
-              <a:t>Ensure you mention the problem, area, and in detail the problem specifics </a:t>
-            </a:r>
-            <a:endParaRPr lang="en-US" sz="2200" b="0" dirty="0"/>
+              <a:t>Start globally &gt; regionally &gt; nationally &gt; locally outline the issue at hand. </a:t>
+            </a:r>
+          </a:p>
+          <a:p>
+            <a:pPr marL="1071562" lvl="4" indent="-342900">
+              <a:buFont typeface="Arial" panose="020B0604020202020204" pitchFamily="34" charset="0"/>
+              <a:buChar char="•"/>
+            </a:pPr>
+            <a:r>
+              <a:rPr lang="en-GB" sz="2100" b="0" dirty="0"/>
+              <a:t>What have other researchers said about this issue? </a:t>
+            </a:r>
+          </a:p>
+          <a:p>
+            <a:pPr marL="1071562" lvl="4" indent="-342900">
+              <a:buFont typeface="Arial" panose="020B0604020202020204" pitchFamily="34" charset="0"/>
+              <a:buChar char="•"/>
+            </a:pPr>
+            <a:r>
+              <a:rPr lang="en-GB" sz="2100" b="0" dirty="0"/>
+              <a:t>What has been done to solve this problem?</a:t>
+            </a:r>
           </a:p>
           <a:p>
             <a:endParaRPr lang="en-US" dirty="0"/>
@@ -8610,7 +9010,7 @@
           <p:cNvPr id="3" name="Footer Placeholder 2">
             <a:extLst>
               <a:ext uri="{FF2B5EF4-FFF2-40B4-BE49-F238E27FC236}">
-                <a16:creationId xmlns:a16="http://schemas.microsoft.com/office/drawing/2014/main" id="{D2E04936-E036-43DF-9217-FBE56BE45E88}"/>
+                <a16:creationId xmlns:a16="http://schemas.microsoft.com/office/drawing/2014/main" id="{6C4530F9-0889-4279-9303-C5AA3812069D}"/>
               </a:ext>
             </a:extLst>
           </p:cNvPr>
@@ -8644,7 +9044,7 @@
           <p:cNvPr id="4" name="Title 3">
             <a:extLst>
               <a:ext uri="{FF2B5EF4-FFF2-40B4-BE49-F238E27FC236}">
-                <a16:creationId xmlns:a16="http://schemas.microsoft.com/office/drawing/2014/main" id="{539128CC-E71B-4E85-9A74-0C32F886C1F4}"/>
+                <a16:creationId xmlns:a16="http://schemas.microsoft.com/office/drawing/2014/main" id="{D19FEA75-F09B-476A-9D35-E7CFB503C85B}"/>
               </a:ext>
             </a:extLst>
           </p:cNvPr>
@@ -8662,7 +9062,7 @@
           <a:p>
             <a:r>
               <a:rPr lang="en-US" dirty="0"/>
-              <a:t>Problem statement</a:t>
+              <a:t>Introduction </a:t>
             </a:r>
           </a:p>
         </p:txBody>
@@ -8670,7 +9070,7 @@
     </p:spTree>
     <p:extLst>
       <p:ext uri="{BB962C8B-B14F-4D97-AF65-F5344CB8AC3E}">
-        <p14:creationId xmlns:p14="http://schemas.microsoft.com/office/powerpoint/2010/main" val="3167592833"/>
+        <p14:creationId xmlns:p14="http://schemas.microsoft.com/office/powerpoint/2010/main" val="3005417860"/>
       </p:ext>
     </p:extLst>
   </p:cSld>
@@ -8702,7 +9102,7 @@
           <p:cNvPr id="2" name="Text Placeholder 1">
             <a:extLst>
               <a:ext uri="{FF2B5EF4-FFF2-40B4-BE49-F238E27FC236}">
-                <a16:creationId xmlns:a16="http://schemas.microsoft.com/office/drawing/2014/main" id="{5CC6ED74-5F37-49DC-99C0-FA564BC975F2}"/>
+                <a16:creationId xmlns:a16="http://schemas.microsoft.com/office/drawing/2014/main" id="{C6BC2DDB-B407-4770-B67A-A85A9B1A8568}"/>
               </a:ext>
             </a:extLst>
           </p:cNvPr>
@@ -8724,7 +9124,7 @@
             </a:pPr>
             <a:r>
               <a:rPr lang="en-GB" sz="2200" b="0" dirty="0"/>
-              <a:t>Outline why this research is important.</a:t>
+              <a:t>By now you’ve identified gaps in the past studies</a:t>
             </a:r>
             <a:endParaRPr lang="en-US" sz="2200" b="0" dirty="0"/>
           </a:p>
@@ -8735,7 +9135,7 @@
             </a:pPr>
             <a:r>
               <a:rPr lang="en-GB" sz="2200" b="0" dirty="0"/>
-              <a:t>What benefits will the project bring?</a:t>
+              <a:t>Clearly outline it here </a:t>
             </a:r>
             <a:endParaRPr lang="en-US" sz="2200" b="0" dirty="0"/>
           </a:p>
@@ -8746,7 +9146,7 @@
             </a:pPr>
             <a:r>
               <a:rPr lang="en-GB" sz="2200" b="0" dirty="0"/>
-              <a:t>What is the cost of not using this technology?  </a:t>
+              <a:t>After reviewing the papers and gaps – what exactly is the problem? state this explicitly.</a:t>
             </a:r>
             <a:endParaRPr lang="en-US" sz="2200" b="0" dirty="0"/>
           </a:p>
@@ -8757,18 +9157,7 @@
             </a:pPr>
             <a:r>
               <a:rPr lang="en-GB" sz="2200" b="0" dirty="0"/>
-              <a:t>Try to get some facts on the actual negative cost e.g. delays in service, expense, etc</a:t>
-            </a:r>
-            <a:endParaRPr lang="en-US" sz="2200" b="0" dirty="0"/>
-          </a:p>
-          <a:p>
-            <a:pPr marL="342900" lvl="0" indent="-342900">
-              <a:buFont typeface="Arial" panose="020B0604020202020204" pitchFamily="34" charset="0"/>
-              <a:buChar char="•"/>
-            </a:pPr>
-            <a:r>
-              <a:rPr lang="en-GB" sz="2200" b="0" dirty="0"/>
-              <a:t>Focus on the good things that your new technologies will bring. </a:t>
+              <a:t>Ensure you mention the problem, area, and in detail the problem specifics </a:t>
             </a:r>
             <a:endParaRPr lang="en-US" sz="2200" b="0" dirty="0"/>
           </a:p>
@@ -8782,7 +9171,7 @@
           <p:cNvPr id="3" name="Footer Placeholder 2">
             <a:extLst>
               <a:ext uri="{FF2B5EF4-FFF2-40B4-BE49-F238E27FC236}">
-                <a16:creationId xmlns:a16="http://schemas.microsoft.com/office/drawing/2014/main" id="{DEA43A47-8989-485A-9656-DD9EC354988F}"/>
+                <a16:creationId xmlns:a16="http://schemas.microsoft.com/office/drawing/2014/main" id="{D2E04936-E036-43DF-9217-FBE56BE45E88}"/>
               </a:ext>
             </a:extLst>
           </p:cNvPr>
@@ -8816,7 +9205,7 @@
           <p:cNvPr id="4" name="Title 3">
             <a:extLst>
               <a:ext uri="{FF2B5EF4-FFF2-40B4-BE49-F238E27FC236}">
-                <a16:creationId xmlns:a16="http://schemas.microsoft.com/office/drawing/2014/main" id="{521A1325-3BD0-458F-A4AB-6DBA48F47E25}"/>
+                <a16:creationId xmlns:a16="http://schemas.microsoft.com/office/drawing/2014/main" id="{539128CC-E71B-4E85-9A74-0C32F886C1F4}"/>
               </a:ext>
             </a:extLst>
           </p:cNvPr>
@@ -8834,7 +9223,7 @@
           <a:p>
             <a:r>
               <a:rPr lang="en-US" dirty="0"/>
-              <a:t>Justification </a:t>
+              <a:t>Problem statement</a:t>
             </a:r>
           </a:p>
         </p:txBody>
@@ -8842,7 +9231,7 @@
     </p:spTree>
     <p:extLst>
       <p:ext uri="{BB962C8B-B14F-4D97-AF65-F5344CB8AC3E}">
-        <p14:creationId xmlns:p14="http://schemas.microsoft.com/office/powerpoint/2010/main" val="3688267804"/>
+        <p14:creationId xmlns:p14="http://schemas.microsoft.com/office/powerpoint/2010/main" val="3167592833"/>
       </p:ext>
     </p:extLst>
   </p:cSld>
@@ -8871,113 +9260,10 @@
       </p:grpSpPr>
       <p:sp>
         <p:nvSpPr>
-          <p:cNvPr id="2" name="Text Placeholder 1">
-            <a:extLst>
-              <a:ext uri="{FF2B5EF4-FFF2-40B4-BE49-F238E27FC236}">
-                <a16:creationId xmlns:a16="http://schemas.microsoft.com/office/drawing/2014/main" id="{4E5C0CA1-44BA-406D-AFD6-72A8EC4BAFE0}"/>
-              </a:ext>
-            </a:extLst>
-          </p:cNvPr>
-          <p:cNvSpPr>
-            <a:spLocks noGrp="1"/>
-          </p:cNvSpPr>
-          <p:nvPr>
-            <p:ph type="body" idx="1"/>
-          </p:nvPr>
-        </p:nvSpPr>
-        <p:spPr/>
-        <p:txBody>
-          <a:bodyPr/>
-          <a:lstStyle/>
-          <a:p>
-            <a:pPr marL="342900" lvl="0" indent="-342900">
-              <a:buFont typeface="Arial" panose="020B0604020202020204" pitchFamily="34" charset="0"/>
-              <a:buChar char="•"/>
-            </a:pPr>
-            <a:r>
-              <a:rPr lang="en-GB" sz="2200" b="0" dirty="0"/>
-              <a:t>To monitor and  predict the occurrence of Harmful Algal Blooms(HABs) and Cyanobacteria.</a:t>
-            </a:r>
-          </a:p>
-          <a:p>
-            <a:pPr marL="358775" lvl="2" indent="0">
-              <a:buNone/>
-            </a:pPr>
-            <a:endParaRPr lang="en-GB" sz="2100" b="0" dirty="0"/>
-          </a:p>
-          <a:p>
-            <a:pPr marL="701675" lvl="2" indent="-342900">
-              <a:buFont typeface="Courier New" panose="02070309020205020404" pitchFamily="49" charset="0"/>
-              <a:buChar char="o"/>
-            </a:pPr>
-            <a:r>
-              <a:rPr lang="en-GB" sz="2100" b="0" dirty="0"/>
-              <a:t>To develop automated </a:t>
-            </a:r>
-            <a:r>
-              <a:rPr lang="en-GB" sz="2100" b="0" i="1" dirty="0"/>
-              <a:t>in-situ</a:t>
-            </a:r>
-            <a:r>
-              <a:rPr lang="en-GB" sz="2100" b="0" dirty="0"/>
-              <a:t> </a:t>
-            </a:r>
-            <a:r>
-              <a:rPr lang="en-GB" sz="2100" dirty="0"/>
-              <a:t>I</a:t>
-            </a:r>
-            <a:r>
-              <a:rPr lang="en-GB" sz="2100" b="0" dirty="0"/>
-              <a:t>nternet </a:t>
-            </a:r>
-            <a:r>
-              <a:rPr lang="en-GB" sz="2100" dirty="0"/>
-              <a:t>o</a:t>
-            </a:r>
-            <a:r>
-              <a:rPr lang="en-GB" sz="2100" b="0" dirty="0"/>
-              <a:t>f </a:t>
-            </a:r>
-            <a:r>
-              <a:rPr lang="en-GB" sz="2100" dirty="0"/>
-              <a:t>T</a:t>
-            </a:r>
-            <a:r>
-              <a:rPr lang="en-GB" sz="2100" b="0" dirty="0"/>
-              <a:t>hings(IoT) sensors to monitor the occurrence of the event.</a:t>
-            </a:r>
-          </a:p>
-          <a:p>
-            <a:pPr marL="701675" lvl="2" indent="-342900">
-              <a:buFont typeface="Courier New" panose="02070309020205020404" pitchFamily="49" charset="0"/>
-              <a:buChar char="o"/>
-            </a:pPr>
-            <a:r>
-              <a:rPr lang="en-GB" sz="2100" b="0" dirty="0"/>
-              <a:t>To develop a system that reports specified geo-tagged data from the above sensors.</a:t>
-            </a:r>
-          </a:p>
-          <a:p>
-            <a:pPr marL="701675" lvl="2" indent="-342900">
-              <a:buFont typeface="Courier New" panose="02070309020205020404" pitchFamily="49" charset="0"/>
-              <a:buChar char="o"/>
-            </a:pPr>
-            <a:r>
-              <a:rPr lang="en-GB" sz="2100" b="0" dirty="0"/>
-              <a:t>To associate Machine Learning models to predict the occurrence of CynoHAB.</a:t>
-            </a:r>
-          </a:p>
-          <a:p>
-            <a:endParaRPr lang="en-US" dirty="0"/>
-          </a:p>
-        </p:txBody>
-      </p:sp>
-      <p:sp>
-        <p:nvSpPr>
           <p:cNvPr id="3" name="Footer Placeholder 2">
             <a:extLst>
               <a:ext uri="{FF2B5EF4-FFF2-40B4-BE49-F238E27FC236}">
-                <a16:creationId xmlns:a16="http://schemas.microsoft.com/office/drawing/2014/main" id="{C817AA26-3EEE-46FC-B635-6068A13A7103}"/>
+                <a16:creationId xmlns:a16="http://schemas.microsoft.com/office/drawing/2014/main" id="{DEA43A47-8989-485A-9656-DD9EC354988F}"/>
               </a:ext>
             </a:extLst>
           </p:cNvPr>
@@ -9011,7 +9297,7 @@
           <p:cNvPr id="4" name="Title 3">
             <a:extLst>
               <a:ext uri="{FF2B5EF4-FFF2-40B4-BE49-F238E27FC236}">
-                <a16:creationId xmlns:a16="http://schemas.microsoft.com/office/drawing/2014/main" id="{7ACF55D0-26BB-401B-BC63-F1F80133AEE8}"/>
+                <a16:creationId xmlns:a16="http://schemas.microsoft.com/office/drawing/2014/main" id="{521A1325-3BD0-458F-A4AB-6DBA48F47E25}"/>
               </a:ext>
             </a:extLst>
           </p:cNvPr>
@@ -9029,15 +9315,123 @@
           <a:p>
             <a:r>
               <a:rPr lang="en-US" dirty="0"/>
-              <a:t>General and specific objectives </a:t>
-            </a:r>
-          </a:p>
-        </p:txBody>
-      </p:sp>
+              <a:t>Justification </a:t>
+            </a:r>
+          </a:p>
+        </p:txBody>
+      </p:sp>
+      <p:pic>
+        <p:nvPicPr>
+          <p:cNvPr id="14" name="Picture 13">
+            <a:extLst>
+              <a:ext uri="{FF2B5EF4-FFF2-40B4-BE49-F238E27FC236}">
+                <a16:creationId xmlns:a16="http://schemas.microsoft.com/office/drawing/2014/main" id="{8A3B11F1-D8B1-4913-AE48-4AC13E71F1DA}"/>
+              </a:ext>
+            </a:extLst>
+          </p:cNvPr>
+          <p:cNvPicPr>
+            <a:picLocks noChangeAspect="1"/>
+          </p:cNvPicPr>
+          <p:nvPr/>
+        </p:nvPicPr>
+        <p:blipFill>
+          <a:blip r:embed="rId2" cstate="print">
+            <a:extLst>
+              <a:ext uri="{28A0092B-C50C-407E-A947-70E740481C1C}">
+                <a14:useLocalDpi xmlns:a14="http://schemas.microsoft.com/office/drawing/2010/main" val="0"/>
+              </a:ext>
+            </a:extLst>
+          </a:blip>
+          <a:stretch>
+            <a:fillRect/>
+          </a:stretch>
+        </p:blipFill>
+        <p:spPr>
+          <a:xfrm>
+            <a:off x="277194" y="1484784"/>
+            <a:ext cx="3614840" cy="2411070"/>
+          </a:xfrm>
+          <a:prstGeom prst="rect">
+            <a:avLst/>
+          </a:prstGeom>
+        </p:spPr>
+      </p:pic>
+      <p:pic>
+        <p:nvPicPr>
+          <p:cNvPr id="16" name="Picture 15">
+            <a:extLst>
+              <a:ext uri="{FF2B5EF4-FFF2-40B4-BE49-F238E27FC236}">
+                <a16:creationId xmlns:a16="http://schemas.microsoft.com/office/drawing/2014/main" id="{F65F7D2B-EA04-4EA7-A32B-21D15E26BC3D}"/>
+              </a:ext>
+            </a:extLst>
+          </p:cNvPr>
+          <p:cNvPicPr>
+            <a:picLocks noChangeAspect="1"/>
+          </p:cNvPicPr>
+          <p:nvPr/>
+        </p:nvPicPr>
+        <p:blipFill>
+          <a:blip r:embed="rId3">
+            <a:extLst>
+              <a:ext uri="{28A0092B-C50C-407E-A947-70E740481C1C}">
+                <a14:useLocalDpi xmlns:a14="http://schemas.microsoft.com/office/drawing/2010/main" val="0"/>
+              </a:ext>
+            </a:extLst>
+          </a:blip>
+          <a:stretch>
+            <a:fillRect/>
+          </a:stretch>
+        </p:blipFill>
+        <p:spPr>
+          <a:xfrm>
+            <a:off x="5391694" y="1484784"/>
+            <a:ext cx="3598612" cy="2411071"/>
+          </a:xfrm>
+          <a:prstGeom prst="rect">
+            <a:avLst/>
+          </a:prstGeom>
+        </p:spPr>
+      </p:pic>
+      <p:pic>
+        <p:nvPicPr>
+          <p:cNvPr id="18" name="Picture 17">
+            <a:extLst>
+              <a:ext uri="{FF2B5EF4-FFF2-40B4-BE49-F238E27FC236}">
+                <a16:creationId xmlns:a16="http://schemas.microsoft.com/office/drawing/2014/main" id="{0A29E4AC-8FE5-4679-AF84-7D781627277B}"/>
+              </a:ext>
+            </a:extLst>
+          </p:cNvPr>
+          <p:cNvPicPr>
+            <a:picLocks noChangeAspect="1"/>
+          </p:cNvPicPr>
+          <p:nvPr/>
+        </p:nvPicPr>
+        <p:blipFill>
+          <a:blip r:embed="rId4">
+            <a:extLst>
+              <a:ext uri="{28A0092B-C50C-407E-A947-70E740481C1C}">
+                <a14:useLocalDpi xmlns:a14="http://schemas.microsoft.com/office/drawing/2010/main" val="0"/>
+              </a:ext>
+            </a:extLst>
+          </a:blip>
+          <a:stretch>
+            <a:fillRect/>
+          </a:stretch>
+        </p:blipFill>
+        <p:spPr>
+          <a:xfrm>
+            <a:off x="2659037" y="3922550"/>
+            <a:ext cx="3825925" cy="2560820"/>
+          </a:xfrm>
+          <a:prstGeom prst="rect">
+            <a:avLst/>
+          </a:prstGeom>
+        </p:spPr>
+      </p:pic>
     </p:spTree>
     <p:extLst>
       <p:ext uri="{BB962C8B-B14F-4D97-AF65-F5344CB8AC3E}">
-        <p14:creationId xmlns:p14="http://schemas.microsoft.com/office/powerpoint/2010/main" val="3268071437"/>
+        <p14:creationId xmlns:p14="http://schemas.microsoft.com/office/powerpoint/2010/main" val="3688267804"/>
       </p:ext>
     </p:extLst>
   </p:cSld>
@@ -9066,7 +9460,13 @@
       </p:grpSpPr>
       <p:sp>
         <p:nvSpPr>
-          <p:cNvPr id="2" name="Text Placeholder 1"/>
+          <p:cNvPr id="2" name="Text Placeholder 1">
+            <a:extLst>
+              <a:ext uri="{FF2B5EF4-FFF2-40B4-BE49-F238E27FC236}">
+                <a16:creationId xmlns:a16="http://schemas.microsoft.com/office/drawing/2014/main" id="{4E5C0CA1-44BA-406D-AFD6-72A8EC4BAFE0}"/>
+              </a:ext>
+            </a:extLst>
+          </p:cNvPr>
           <p:cNvSpPr>
             <a:spLocks noGrp="1"/>
           </p:cNvSpPr>
@@ -9079,13 +9479,97 @@
           <a:bodyPr/>
           <a:lstStyle/>
           <a:p>
-            <a:endParaRPr lang="en-US"/>
-          </a:p>
-        </p:txBody>
-      </p:sp>
-      <p:sp>
-        <p:nvSpPr>
-          <p:cNvPr id="3" name="Footer Placeholder 2"/>
+            <a:pPr marL="342900" lvl="0" indent="-342900">
+              <a:buFont typeface="Arial" panose="020B0604020202020204" pitchFamily="34" charset="0"/>
+              <a:buChar char="•"/>
+            </a:pPr>
+            <a:r>
+              <a:rPr lang="en-GB" sz="2200" b="0" dirty="0"/>
+              <a:t>To monitor and  predict the occurrence of Harmful Algal Blooms(HABs) and Cyanobacteria.</a:t>
+            </a:r>
+          </a:p>
+          <a:p>
+            <a:pPr marL="358775" lvl="2" indent="0">
+              <a:buNone/>
+            </a:pPr>
+            <a:endParaRPr lang="en-GB" sz="2100" b="0" dirty="0"/>
+          </a:p>
+          <a:p>
+            <a:pPr marL="701675" lvl="2" indent="-342900">
+              <a:buFont typeface="Courier New" panose="02070309020205020404" pitchFamily="49" charset="0"/>
+              <a:buChar char="o"/>
+            </a:pPr>
+            <a:r>
+              <a:rPr lang="en-GB" sz="2100" b="0" dirty="0"/>
+              <a:t>To develop automated </a:t>
+            </a:r>
+            <a:r>
+              <a:rPr lang="en-GB" sz="2100" b="0" i="1" dirty="0"/>
+              <a:t>in-situ</a:t>
+            </a:r>
+            <a:r>
+              <a:rPr lang="en-GB" sz="2100" b="0" dirty="0"/>
+              <a:t> </a:t>
+            </a:r>
+            <a:r>
+              <a:rPr lang="en-GB" sz="2100" dirty="0"/>
+              <a:t>I</a:t>
+            </a:r>
+            <a:r>
+              <a:rPr lang="en-GB" sz="2100" b="0" dirty="0"/>
+              <a:t>nternet </a:t>
+            </a:r>
+            <a:r>
+              <a:rPr lang="en-GB" sz="2100" dirty="0"/>
+              <a:t>o</a:t>
+            </a:r>
+            <a:r>
+              <a:rPr lang="en-GB" sz="2100" b="0" dirty="0"/>
+              <a:t>f </a:t>
+            </a:r>
+            <a:r>
+              <a:rPr lang="en-GB" sz="2100" dirty="0"/>
+              <a:t>T</a:t>
+            </a:r>
+            <a:r>
+              <a:rPr lang="en-GB" sz="2100" b="0" dirty="0"/>
+              <a:t>hings(IoT) sensors to monitor the occurrence of the event.</a:t>
+            </a:r>
+          </a:p>
+          <a:p>
+            <a:pPr marL="701675" lvl="2" indent="-342900">
+              <a:buFont typeface="Courier New" panose="02070309020205020404" pitchFamily="49" charset="0"/>
+              <a:buChar char="o"/>
+            </a:pPr>
+            <a:r>
+              <a:rPr lang="en-GB" sz="2100" b="0" dirty="0"/>
+              <a:t>To develop a system that reports specified geo-tagged data from the above sensors.</a:t>
+            </a:r>
+          </a:p>
+          <a:p>
+            <a:pPr marL="701675" lvl="2" indent="-342900">
+              <a:buFont typeface="Courier New" panose="02070309020205020404" pitchFamily="49" charset="0"/>
+              <a:buChar char="o"/>
+            </a:pPr>
+            <a:r>
+              <a:rPr lang="en-GB" sz="2100" b="0" dirty="0"/>
+              <a:t>To associate Machine Learning models to predict the occurrence of CynoHAB.</a:t>
+            </a:r>
+          </a:p>
+          <a:p>
+            <a:endParaRPr lang="en-US" dirty="0"/>
+          </a:p>
+        </p:txBody>
+      </p:sp>
+      <p:sp>
+        <p:nvSpPr>
+          <p:cNvPr id="3" name="Footer Placeholder 2">
+            <a:extLst>
+              <a:ext uri="{FF2B5EF4-FFF2-40B4-BE49-F238E27FC236}">
+                <a16:creationId xmlns:a16="http://schemas.microsoft.com/office/drawing/2014/main" id="{C817AA26-3EEE-46FC-B635-6068A13A7103}"/>
+              </a:ext>
+            </a:extLst>
+          </p:cNvPr>
           <p:cNvSpPr>
             <a:spLocks noGrp="1"/>
           </p:cNvSpPr>
@@ -9113,7 +9597,13 @@
       </p:sp>
       <p:sp>
         <p:nvSpPr>
-          <p:cNvPr id="4" name="Title 3"/>
+          <p:cNvPr id="4" name="Title 3">
+            <a:extLst>
+              <a:ext uri="{FF2B5EF4-FFF2-40B4-BE49-F238E27FC236}">
+                <a16:creationId xmlns:a16="http://schemas.microsoft.com/office/drawing/2014/main" id="{7ACF55D0-26BB-401B-BC63-F1F80133AEE8}"/>
+              </a:ext>
+            </a:extLst>
+          </p:cNvPr>
           <p:cNvSpPr>
             <a:spLocks noGrp="1"/>
           </p:cNvSpPr>
@@ -9128,7 +9618,7 @@
           <a:p>
             <a:r>
               <a:rPr lang="en-US" dirty="0"/>
-              <a:t>Study Area</a:t>
+              <a:t>General and specific objectives </a:t>
             </a:r>
           </a:p>
         </p:txBody>
@@ -9136,7 +9626,7 @@
     </p:spTree>
     <p:extLst>
       <p:ext uri="{BB962C8B-B14F-4D97-AF65-F5344CB8AC3E}">
-        <p14:creationId xmlns:p14="http://schemas.microsoft.com/office/powerpoint/2010/main" val="1202890703"/>
+        <p14:creationId xmlns:p14="http://schemas.microsoft.com/office/powerpoint/2010/main" val="3268071437"/>
       </p:ext>
     </p:extLst>
   </p:cSld>
@@ -9165,12 +9655,18 @@
       </p:grpSpPr>
       <p:sp>
         <p:nvSpPr>
-          <p:cNvPr id="2" name="Text Placeholder 1"/>
+          <p:cNvPr id="2" name="Content Placeholder 1">
+            <a:extLst>
+              <a:ext uri="{FF2B5EF4-FFF2-40B4-BE49-F238E27FC236}">
+                <a16:creationId xmlns:a16="http://schemas.microsoft.com/office/drawing/2014/main" id="{755D444D-55A6-440E-8E91-B83D873B37FF}"/>
+              </a:ext>
+            </a:extLst>
+          </p:cNvPr>
           <p:cNvSpPr>
             <a:spLocks noGrp="1"/>
           </p:cNvSpPr>
           <p:nvPr>
-            <p:ph type="body" idx="1"/>
+            <p:ph idx="1"/>
           </p:nvPr>
         </p:nvSpPr>
         <p:spPr/>
@@ -9178,13 +9674,43 @@
           <a:bodyPr/>
           <a:lstStyle/>
           <a:p>
-            <a:endParaRPr lang="en-US" dirty="0"/>
-          </a:p>
-        </p:txBody>
-      </p:sp>
-      <p:sp>
-        <p:nvSpPr>
-          <p:cNvPr id="3" name="Footer Placeholder 2"/>
+            <a:r>
+              <a:rPr lang="en-US" dirty="0"/>
+              <a:t>Data &amp; Materials;</a:t>
+            </a:r>
+          </a:p>
+          <a:p>
+            <a:endParaRPr lang="en-US" b="0" dirty="0"/>
+          </a:p>
+          <a:p>
+            <a:endParaRPr lang="en-US" b="0" dirty="0"/>
+          </a:p>
+          <a:p>
+            <a:endParaRPr lang="en-US" b="0" dirty="0"/>
+          </a:p>
+          <a:p>
+            <a:endParaRPr lang="en-US" b="0" dirty="0"/>
+          </a:p>
+          <a:p>
+            <a:endParaRPr lang="en-US" b="0" dirty="0"/>
+          </a:p>
+          <a:p>
+            <a:endParaRPr lang="en-US" b="0" dirty="0"/>
+          </a:p>
+          <a:p>
+            <a:endParaRPr lang="en-US" b="0" dirty="0"/>
+          </a:p>
+        </p:txBody>
+      </p:sp>
+      <p:sp>
+        <p:nvSpPr>
+          <p:cNvPr id="3" name="Footer Placeholder 2">
+            <a:extLst>
+              <a:ext uri="{FF2B5EF4-FFF2-40B4-BE49-F238E27FC236}">
+                <a16:creationId xmlns:a16="http://schemas.microsoft.com/office/drawing/2014/main" id="{9BB4DB60-1758-4E02-A89F-686D8739A838}"/>
+              </a:ext>
+            </a:extLst>
+          </p:cNvPr>
           <p:cNvSpPr>
             <a:spLocks noGrp="1"/>
           </p:cNvSpPr>
@@ -9212,7 +9738,13 @@
       </p:sp>
       <p:sp>
         <p:nvSpPr>
-          <p:cNvPr id="4" name="Title 3"/>
+          <p:cNvPr id="4" name="Title 3">
+            <a:extLst>
+              <a:ext uri="{FF2B5EF4-FFF2-40B4-BE49-F238E27FC236}">
+                <a16:creationId xmlns:a16="http://schemas.microsoft.com/office/drawing/2014/main" id="{9CCC4049-E8FA-4673-901A-83D690562A9C}"/>
+              </a:ext>
+            </a:extLst>
+          </p:cNvPr>
           <p:cNvSpPr>
             <a:spLocks noGrp="1"/>
           </p:cNvSpPr>
@@ -9227,15 +9759,691 @@
           <a:p>
             <a:r>
               <a:rPr lang="en-US" dirty="0"/>
-              <a:t>Data &amp; Materials</a:t>
-            </a:r>
-          </a:p>
-        </p:txBody>
-      </p:sp>
+              <a:t>Overall Methodology : Data and Materials</a:t>
+            </a:r>
+          </a:p>
+        </p:txBody>
+      </p:sp>
+      <p:graphicFrame>
+        <p:nvGraphicFramePr>
+          <p:cNvPr id="5" name="Table 5">
+            <a:extLst>
+              <a:ext uri="{FF2B5EF4-FFF2-40B4-BE49-F238E27FC236}">
+                <a16:creationId xmlns:a16="http://schemas.microsoft.com/office/drawing/2014/main" id="{084616EF-BDFF-45E6-B67D-5C8123AD7432}"/>
+              </a:ext>
+            </a:extLst>
+          </p:cNvPr>
+          <p:cNvGraphicFramePr>
+            <a:graphicFrameLocks noGrp="1"/>
+          </p:cNvGraphicFramePr>
+          <p:nvPr>
+            <p:extLst>
+              <p:ext uri="{D42A27DB-BD31-4B8C-83A1-F6EECF244321}">
+                <p14:modId xmlns:p14="http://schemas.microsoft.com/office/powerpoint/2010/main" val="386310816"/>
+              </p:ext>
+            </p:extLst>
+          </p:nvPr>
+        </p:nvGraphicFramePr>
+        <p:xfrm>
+          <a:off x="250825" y="1844824"/>
+          <a:ext cx="8640762" cy="2448270"/>
+        </p:xfrm>
+        <a:graphic>
+          <a:graphicData uri="http://schemas.openxmlformats.org/drawingml/2006/table">
+            <a:tbl>
+              <a:tblPr firstRow="1" bandRow="1">
+                <a:tableStyleId>{21E4AEA4-8DFA-4A89-87EB-49C32662AFE0}</a:tableStyleId>
+              </a:tblPr>
+              <a:tblGrid>
+                <a:gridCol w="2568875">
+                  <a:extLst>
+                    <a:ext uri="{9D8B030D-6E8A-4147-A177-3AD203B41FA5}">
+                      <a16:colId xmlns:a16="http://schemas.microsoft.com/office/drawing/2014/main" val="1983597191"/>
+                    </a:ext>
+                  </a:extLst>
+                </a:gridCol>
+                <a:gridCol w="4281458">
+                  <a:extLst>
+                    <a:ext uri="{9D8B030D-6E8A-4147-A177-3AD203B41FA5}">
+                      <a16:colId xmlns:a16="http://schemas.microsoft.com/office/drawing/2014/main" val="504941183"/>
+                    </a:ext>
+                  </a:extLst>
+                </a:gridCol>
+                <a:gridCol w="1790429">
+                  <a:extLst>
+                    <a:ext uri="{9D8B030D-6E8A-4147-A177-3AD203B41FA5}">
+                      <a16:colId xmlns:a16="http://schemas.microsoft.com/office/drawing/2014/main" val="2863412154"/>
+                    </a:ext>
+                  </a:extLst>
+                </a:gridCol>
+              </a:tblGrid>
+              <a:tr h="431106">
+                <a:tc>
+                  <a:txBody>
+                    <a:bodyPr/>
+                    <a:lstStyle/>
+                    <a:p>
+                      <a:r>
+                        <a:rPr lang="en-US" dirty="0">
+                          <a:solidFill>
+                            <a:schemeClr val="bg1"/>
+                          </a:solidFill>
+                        </a:rPr>
+                        <a:t>Data Type</a:t>
+                      </a:r>
+                    </a:p>
+                  </a:txBody>
+                  <a:tcPr/>
+                </a:tc>
+                <a:tc>
+                  <a:txBody>
+                    <a:bodyPr/>
+                    <a:lstStyle/>
+                    <a:p>
+                      <a:r>
+                        <a:rPr lang="en-US" dirty="0">
+                          <a:solidFill>
+                            <a:schemeClr val="bg1"/>
+                          </a:solidFill>
+                        </a:rPr>
+                        <a:t>Source</a:t>
+                      </a:r>
+                    </a:p>
+                  </a:txBody>
+                  <a:tcPr/>
+                </a:tc>
+                <a:tc>
+                  <a:txBody>
+                    <a:bodyPr/>
+                    <a:lstStyle/>
+                    <a:p>
+                      <a:r>
+                        <a:rPr lang="en-US" u="none" dirty="0">
+                          <a:solidFill>
+                            <a:schemeClr val="bg1"/>
+                          </a:solidFill>
+                        </a:rPr>
+                        <a:t>Access</a:t>
+                      </a:r>
+                    </a:p>
+                  </a:txBody>
+                  <a:tcPr/>
+                </a:tc>
+                <a:extLst>
+                  <a:ext uri="{0D108BD9-81ED-4DB2-BD59-A6C34878D82A}">
+                    <a16:rowId xmlns:a16="http://schemas.microsoft.com/office/drawing/2014/main" val="3601207383"/>
+                  </a:ext>
+                </a:extLst>
+              </a:tr>
+              <a:tr h="431106">
+                <a:tc>
+                  <a:txBody>
+                    <a:bodyPr/>
+                    <a:lstStyle/>
+                    <a:p>
+                      <a:r>
+                        <a:rPr lang="en-US" dirty="0">
+                          <a:solidFill>
+                            <a:schemeClr val="tx1"/>
+                          </a:solidFill>
+                        </a:rPr>
+                        <a:t>Shapefiles</a:t>
+                      </a:r>
+                      <a:endParaRPr lang="en-US" dirty="0"/>
+                    </a:p>
+                  </a:txBody>
+                  <a:tcPr/>
+                </a:tc>
+                <a:tc>
+                  <a:txBody>
+                    <a:bodyPr/>
+                    <a:lstStyle/>
+                    <a:p>
+                      <a:r>
+                        <a:rPr lang="en-US" sz="1400" b="0" dirty="0"/>
+                        <a:t>Database of Global Administrative Areas- </a:t>
+                      </a:r>
+                      <a:r>
+                        <a:rPr lang="en-US" sz="1400" dirty="0">
+                          <a:solidFill>
+                            <a:schemeClr val="tx1"/>
+                          </a:solidFill>
+                        </a:rPr>
+                        <a:t>GADM</a:t>
+                      </a:r>
+                      <a:endParaRPr lang="en-US" sz="1400" dirty="0"/>
+                    </a:p>
+                  </a:txBody>
+                  <a:tcPr/>
+                </a:tc>
+                <a:tc>
+                  <a:txBody>
+                    <a:bodyPr/>
+                    <a:lstStyle/>
+                    <a:p>
+                      <a:r>
+                        <a:rPr lang="en-US" dirty="0">
+                          <a:solidFill>
+                            <a:schemeClr val="tx1"/>
+                          </a:solidFill>
+                        </a:rPr>
+                        <a:t>Free</a:t>
+                      </a:r>
+                      <a:endParaRPr lang="en-US" dirty="0"/>
+                    </a:p>
+                  </a:txBody>
+                  <a:tcPr/>
+                </a:tc>
+                <a:extLst>
+                  <a:ext uri="{0D108BD9-81ED-4DB2-BD59-A6C34878D82A}">
+                    <a16:rowId xmlns:a16="http://schemas.microsoft.com/office/drawing/2014/main" val="1658327389"/>
+                  </a:ext>
+                </a:extLst>
+              </a:tr>
+              <a:tr h="431106">
+                <a:tc>
+                  <a:txBody>
+                    <a:bodyPr/>
+                    <a:lstStyle/>
+                    <a:p>
+                      <a:r>
+                        <a:rPr lang="en-US" dirty="0"/>
+                        <a:t>MODIS Aqua</a:t>
+                      </a:r>
+                    </a:p>
+                  </a:txBody>
+                  <a:tcPr/>
+                </a:tc>
+                <a:tc>
+                  <a:txBody>
+                    <a:bodyPr/>
+                    <a:lstStyle/>
+                    <a:p>
+                      <a:r>
+                        <a:rPr lang="en-US" dirty="0">
+                          <a:solidFill>
+                            <a:schemeClr val="tx1"/>
+                          </a:solidFill>
+                        </a:rPr>
+                        <a:t>Google Earth Engine Cloud Repo</a:t>
+                      </a:r>
+                    </a:p>
+                  </a:txBody>
+                  <a:tcPr/>
+                </a:tc>
+                <a:tc>
+                  <a:txBody>
+                    <a:bodyPr/>
+                    <a:lstStyle/>
+                    <a:p>
+                      <a:r>
+                        <a:rPr lang="en-US" dirty="0"/>
+                        <a:t>Free</a:t>
+                      </a:r>
+                    </a:p>
+                  </a:txBody>
+                  <a:tcPr/>
+                </a:tc>
+                <a:extLst>
+                  <a:ext uri="{0D108BD9-81ED-4DB2-BD59-A6C34878D82A}">
+                    <a16:rowId xmlns:a16="http://schemas.microsoft.com/office/drawing/2014/main" val="1872176473"/>
+                  </a:ext>
+                </a:extLst>
+              </a:tr>
+              <a:tr h="431106">
+                <a:tc>
+                  <a:txBody>
+                    <a:bodyPr/>
+                    <a:lstStyle/>
+                    <a:p>
+                      <a:r>
+                        <a:rPr lang="en-US" dirty="0"/>
+                        <a:t>Landsat 8 OLI</a:t>
+                      </a:r>
+                    </a:p>
+                  </a:txBody>
+                  <a:tcPr/>
+                </a:tc>
+                <a:tc>
+                  <a:txBody>
+                    <a:bodyPr/>
+                    <a:lstStyle/>
+                    <a:p>
+                      <a:pPr marL="0" marR="0" lvl="0" indent="0" algn="l" defTabSz="914400" rtl="0" eaLnBrk="1" fontAlgn="auto" latinLnBrk="0" hangingPunct="1">
+                        <a:lnSpc>
+                          <a:spcPct val="100000"/>
+                        </a:lnSpc>
+                        <a:spcBef>
+                          <a:spcPts val="0"/>
+                        </a:spcBef>
+                        <a:spcAft>
+                          <a:spcPts val="0"/>
+                        </a:spcAft>
+                        <a:buClrTx/>
+                        <a:buSzTx/>
+                        <a:buFontTx/>
+                        <a:buNone/>
+                        <a:tabLst/>
+                        <a:defRPr/>
+                      </a:pPr>
+                      <a:r>
+                        <a:rPr lang="en-US" dirty="0"/>
+                        <a:t>Google Earth Engine Cloud Repo</a:t>
+                      </a:r>
+                    </a:p>
+                  </a:txBody>
+                  <a:tcPr/>
+                </a:tc>
+                <a:tc>
+                  <a:txBody>
+                    <a:bodyPr/>
+                    <a:lstStyle/>
+                    <a:p>
+                      <a:r>
+                        <a:rPr lang="en-US" dirty="0"/>
+                        <a:t>Free</a:t>
+                      </a:r>
+                    </a:p>
+                  </a:txBody>
+                  <a:tcPr/>
+                </a:tc>
+                <a:extLst>
+                  <a:ext uri="{0D108BD9-81ED-4DB2-BD59-A6C34878D82A}">
+                    <a16:rowId xmlns:a16="http://schemas.microsoft.com/office/drawing/2014/main" val="1855506389"/>
+                  </a:ext>
+                </a:extLst>
+              </a:tr>
+              <a:tr h="723846">
+                <a:tc>
+                  <a:txBody>
+                    <a:bodyPr/>
+                    <a:lstStyle/>
+                    <a:p>
+                      <a:r>
+                        <a:rPr lang="en-US" dirty="0"/>
+                        <a:t>In-Situ &amp; Meteorology Data</a:t>
+                      </a:r>
+                    </a:p>
+                  </a:txBody>
+                  <a:tcPr/>
+                </a:tc>
+                <a:tc>
+                  <a:txBody>
+                    <a:bodyPr/>
+                    <a:lstStyle/>
+                    <a:p>
+                      <a:pPr marL="0" marR="0" lvl="0" indent="0" algn="l" defTabSz="914400" rtl="0" eaLnBrk="1" fontAlgn="auto" latinLnBrk="0" hangingPunct="1">
+                        <a:lnSpc>
+                          <a:spcPct val="100000"/>
+                        </a:lnSpc>
+                        <a:spcBef>
+                          <a:spcPts val="0"/>
+                        </a:spcBef>
+                        <a:spcAft>
+                          <a:spcPts val="0"/>
+                        </a:spcAft>
+                        <a:buClrTx/>
+                        <a:buSzTx/>
+                        <a:buFontTx/>
+                        <a:buNone/>
+                        <a:tabLst/>
+                        <a:defRPr/>
+                      </a:pPr>
+                      <a:r>
+                        <a:rPr lang="en-US" dirty="0"/>
+                        <a:t>Lake Victoria Water Quality Mgt</a:t>
+                      </a:r>
+                    </a:p>
+                    <a:p>
+                      <a:pPr marL="0" marR="0" lvl="0" indent="0" algn="l" defTabSz="914400" rtl="0" eaLnBrk="1" fontAlgn="auto" latinLnBrk="0" hangingPunct="1">
+                        <a:lnSpc>
+                          <a:spcPct val="100000"/>
+                        </a:lnSpc>
+                        <a:spcBef>
+                          <a:spcPts val="0"/>
+                        </a:spcBef>
+                        <a:spcAft>
+                          <a:spcPts val="0"/>
+                        </a:spcAft>
+                        <a:buClrTx/>
+                        <a:buSzTx/>
+                        <a:buFontTx/>
+                        <a:buNone/>
+                        <a:tabLst/>
+                        <a:defRPr/>
+                      </a:pPr>
+                      <a:r>
+                        <a:rPr lang="en-US" dirty="0"/>
+                        <a:t>My Automated </a:t>
+                      </a:r>
+                      <a:r>
+                        <a:rPr lang="en-US" i="1" dirty="0"/>
+                        <a:t>In-situ</a:t>
+                      </a:r>
+                      <a:r>
+                        <a:rPr lang="en-US" dirty="0"/>
+                        <a:t> System</a:t>
+                      </a:r>
+                    </a:p>
+                  </a:txBody>
+                  <a:tcPr/>
+                </a:tc>
+                <a:tc>
+                  <a:txBody>
+                    <a:bodyPr/>
+                    <a:lstStyle/>
+                    <a:p>
+                      <a:r>
+                        <a:rPr lang="en-US" sz="1400" dirty="0"/>
+                        <a:t>-Uncertain</a:t>
+                      </a:r>
+                    </a:p>
+                    <a:p>
+                      <a:r>
+                        <a:rPr lang="en-US" sz="1400" dirty="0"/>
+                        <a:t>-Within my control</a:t>
+                      </a:r>
+                    </a:p>
+                  </a:txBody>
+                  <a:tcPr/>
+                </a:tc>
+                <a:extLst>
+                  <a:ext uri="{0D108BD9-81ED-4DB2-BD59-A6C34878D82A}">
+                    <a16:rowId xmlns:a16="http://schemas.microsoft.com/office/drawing/2014/main" val="718357179"/>
+                  </a:ext>
+                </a:extLst>
+              </a:tr>
+            </a:tbl>
+          </a:graphicData>
+        </a:graphic>
+      </p:graphicFrame>
+      <p:graphicFrame>
+        <p:nvGraphicFramePr>
+          <p:cNvPr id="6" name="Table 6">
+            <a:extLst>
+              <a:ext uri="{FF2B5EF4-FFF2-40B4-BE49-F238E27FC236}">
+                <a16:creationId xmlns:a16="http://schemas.microsoft.com/office/drawing/2014/main" id="{FF4859D7-C0B6-42C9-A5BA-F0D58A53AA37}"/>
+              </a:ext>
+            </a:extLst>
+          </p:cNvPr>
+          <p:cNvGraphicFramePr>
+            <a:graphicFrameLocks noGrp="1"/>
+          </p:cNvGraphicFramePr>
+          <p:nvPr>
+            <p:extLst>
+              <p:ext uri="{D42A27DB-BD31-4B8C-83A1-F6EECF244321}">
+                <p14:modId xmlns:p14="http://schemas.microsoft.com/office/powerpoint/2010/main" val="1560470359"/>
+              </p:ext>
+            </p:extLst>
+          </p:nvPr>
+        </p:nvGraphicFramePr>
+        <p:xfrm>
+          <a:off x="250824" y="4437112"/>
+          <a:ext cx="8640763" cy="2257374"/>
+        </p:xfrm>
+        <a:graphic>
+          <a:graphicData uri="http://schemas.openxmlformats.org/drawingml/2006/table">
+            <a:tbl>
+              <a:tblPr firstRow="1" bandRow="1">
+                <a:tableStyleId>{93296810-A885-4BE3-A3E7-6D5BEEA58F35}</a:tableStyleId>
+              </a:tblPr>
+              <a:tblGrid>
+                <a:gridCol w="2306064">
+                  <a:extLst>
+                    <a:ext uri="{9D8B030D-6E8A-4147-A177-3AD203B41FA5}">
+                      <a16:colId xmlns:a16="http://schemas.microsoft.com/office/drawing/2014/main" val="955251707"/>
+                    </a:ext>
+                  </a:extLst>
+                </a:gridCol>
+                <a:gridCol w="4031336">
+                  <a:extLst>
+                    <a:ext uri="{9D8B030D-6E8A-4147-A177-3AD203B41FA5}">
+                      <a16:colId xmlns:a16="http://schemas.microsoft.com/office/drawing/2014/main" val="408544689"/>
+                    </a:ext>
+                  </a:extLst>
+                </a:gridCol>
+                <a:gridCol w="2303363">
+                  <a:extLst>
+                    <a:ext uri="{9D8B030D-6E8A-4147-A177-3AD203B41FA5}">
+                      <a16:colId xmlns:a16="http://schemas.microsoft.com/office/drawing/2014/main" val="140147230"/>
+                    </a:ext>
+                  </a:extLst>
+                </a:gridCol>
+              </a:tblGrid>
+              <a:tr h="402736">
+                <a:tc>
+                  <a:txBody>
+                    <a:bodyPr/>
+                    <a:lstStyle/>
+                    <a:p>
+                      <a:r>
+                        <a:rPr lang="en-US" dirty="0"/>
+                        <a:t>Tool/ Material</a:t>
+                      </a:r>
+                    </a:p>
+                  </a:txBody>
+                  <a:tcPr/>
+                </a:tc>
+                <a:tc>
+                  <a:txBody>
+                    <a:bodyPr/>
+                    <a:lstStyle/>
+                    <a:p>
+                      <a:r>
+                        <a:rPr lang="en-US" dirty="0"/>
+                        <a:t>Role</a:t>
+                      </a:r>
+                    </a:p>
+                  </a:txBody>
+                  <a:tcPr/>
+                </a:tc>
+                <a:tc>
+                  <a:txBody>
+                    <a:bodyPr/>
+                    <a:lstStyle/>
+                    <a:p>
+                      <a:r>
+                        <a:rPr lang="en-US" dirty="0"/>
+                        <a:t>Availability</a:t>
+                      </a:r>
+                    </a:p>
+                  </a:txBody>
+                  <a:tcPr/>
+                </a:tc>
+                <a:extLst>
+                  <a:ext uri="{0D108BD9-81ED-4DB2-BD59-A6C34878D82A}">
+                    <a16:rowId xmlns:a16="http://schemas.microsoft.com/office/drawing/2014/main" val="1507705297"/>
+                  </a:ext>
+                </a:extLst>
+              </a:tr>
+              <a:tr h="402736">
+                <a:tc>
+                  <a:txBody>
+                    <a:bodyPr/>
+                    <a:lstStyle/>
+                    <a:p>
+                      <a:r>
+                        <a:rPr lang="en-US" dirty="0"/>
+                        <a:t>Google Earth Engine</a:t>
+                      </a:r>
+                    </a:p>
+                  </a:txBody>
+                  <a:tcPr/>
+                </a:tc>
+                <a:tc>
+                  <a:txBody>
+                    <a:bodyPr/>
+                    <a:lstStyle/>
+                    <a:p>
+                      <a:r>
+                        <a:rPr lang="en-US" dirty="0"/>
+                        <a:t>Geocomputation &amp; Processing</a:t>
+                      </a:r>
+                    </a:p>
+                  </a:txBody>
+                  <a:tcPr/>
+                </a:tc>
+                <a:tc>
+                  <a:txBody>
+                    <a:bodyPr/>
+                    <a:lstStyle/>
+                    <a:p>
+                      <a:r>
+                        <a:rPr lang="en-US" dirty="0"/>
+                        <a:t>Freely Available</a:t>
+                      </a:r>
+                    </a:p>
+                  </a:txBody>
+                  <a:tcPr/>
+                </a:tc>
+                <a:extLst>
+                  <a:ext uri="{0D108BD9-81ED-4DB2-BD59-A6C34878D82A}">
+                    <a16:rowId xmlns:a16="http://schemas.microsoft.com/office/drawing/2014/main" val="1478603882"/>
+                  </a:ext>
+                </a:extLst>
+              </a:tr>
+              <a:tr h="402736">
+                <a:tc>
+                  <a:txBody>
+                    <a:bodyPr/>
+                    <a:lstStyle/>
+                    <a:p>
+                      <a:r>
+                        <a:rPr lang="en-US" dirty="0"/>
+                        <a:t>QGIS</a:t>
+                      </a:r>
+                      <a:r>
+                        <a:rPr lang="en-US"/>
+                        <a:t>, R &amp; Python</a:t>
+                      </a:r>
+                      <a:endParaRPr lang="en-US" dirty="0"/>
+                    </a:p>
+                  </a:txBody>
+                  <a:tcPr/>
+                </a:tc>
+                <a:tc>
+                  <a:txBody>
+                    <a:bodyPr/>
+                    <a:lstStyle/>
+                    <a:p>
+                      <a:r>
+                        <a:rPr lang="en-US" dirty="0"/>
+                        <a:t>Further Analysis, Maps &amp; Prediction</a:t>
+                      </a:r>
+                    </a:p>
+                  </a:txBody>
+                  <a:tcPr/>
+                </a:tc>
+                <a:tc>
+                  <a:txBody>
+                    <a:bodyPr/>
+                    <a:lstStyle/>
+                    <a:p>
+                      <a:r>
+                        <a:rPr lang="en-US" dirty="0"/>
+                        <a:t>Free</a:t>
+                      </a:r>
+                    </a:p>
+                  </a:txBody>
+                  <a:tcPr/>
+                </a:tc>
+                <a:extLst>
+                  <a:ext uri="{0D108BD9-81ED-4DB2-BD59-A6C34878D82A}">
+                    <a16:rowId xmlns:a16="http://schemas.microsoft.com/office/drawing/2014/main" val="4003800983"/>
+                  </a:ext>
+                </a:extLst>
+              </a:tr>
+              <a:tr h="646430">
+                <a:tc>
+                  <a:txBody>
+                    <a:bodyPr/>
+                    <a:lstStyle/>
+                    <a:p>
+                      <a:r>
+                        <a:rPr lang="en-US" dirty="0"/>
+                        <a:t>Microcontroller, Sensors &amp; Gateway</a:t>
+                      </a:r>
+                    </a:p>
+                  </a:txBody>
+                  <a:tcPr/>
+                </a:tc>
+                <a:tc>
+                  <a:txBody>
+                    <a:bodyPr/>
+                    <a:lstStyle/>
+                    <a:p>
+                      <a:r>
+                        <a:rPr lang="en-US" dirty="0"/>
+                        <a:t>In-situ data collection &amp; Monitoring</a:t>
+                      </a:r>
+                    </a:p>
+                  </a:txBody>
+                  <a:tcPr/>
+                </a:tc>
+                <a:tc>
+                  <a:txBody>
+                    <a:bodyPr/>
+                    <a:lstStyle/>
+                    <a:p>
+                      <a:r>
+                        <a:rPr lang="en-US" dirty="0"/>
+                        <a:t>Local Purchase</a:t>
+                      </a:r>
+                    </a:p>
+                  </a:txBody>
+                  <a:tcPr/>
+                </a:tc>
+                <a:extLst>
+                  <a:ext uri="{0D108BD9-81ED-4DB2-BD59-A6C34878D82A}">
+                    <a16:rowId xmlns:a16="http://schemas.microsoft.com/office/drawing/2014/main" val="42632884"/>
+                  </a:ext>
+                </a:extLst>
+              </a:tr>
+              <a:tr h="402736">
+                <a:tc>
+                  <a:txBody>
+                    <a:bodyPr/>
+                    <a:lstStyle/>
+                    <a:p>
+                      <a:endParaRPr lang="en-US" dirty="0"/>
+                    </a:p>
+                  </a:txBody>
+                  <a:tcPr/>
+                </a:tc>
+                <a:tc>
+                  <a:txBody>
+                    <a:bodyPr/>
+                    <a:lstStyle/>
+                    <a:p>
+                      <a:endParaRPr lang="en-US" dirty="0"/>
+                    </a:p>
+                  </a:txBody>
+                  <a:tcPr/>
+                </a:tc>
+                <a:tc>
+                  <a:txBody>
+                    <a:bodyPr/>
+                    <a:lstStyle/>
+                    <a:p>
+                      <a:endParaRPr lang="en-US" dirty="0"/>
+                    </a:p>
+                  </a:txBody>
+                  <a:tcPr/>
+                </a:tc>
+                <a:extLst>
+                  <a:ext uri="{0D108BD9-81ED-4DB2-BD59-A6C34878D82A}">
+                    <a16:rowId xmlns:a16="http://schemas.microsoft.com/office/drawing/2014/main" val="213344512"/>
+                  </a:ext>
+                </a:extLst>
+              </a:tr>
+            </a:tbl>
+          </a:graphicData>
+        </a:graphic>
+      </p:graphicFrame>
     </p:spTree>
     <p:extLst>
       <p:ext uri="{BB962C8B-B14F-4D97-AF65-F5344CB8AC3E}">
-        <p14:creationId xmlns:p14="http://schemas.microsoft.com/office/powerpoint/2010/main" val="1803766274"/>
+        <p14:creationId xmlns:p14="http://schemas.microsoft.com/office/powerpoint/2010/main" val="86541042"/>
       </p:ext>
     </p:extLst>
   </p:cSld>
@@ -9262,157 +10470,112 @@
           <a:chExt cx="0" cy="0"/>
         </a:xfrm>
       </p:grpSpPr>
-      <p:sp>
-        <p:nvSpPr>
-          <p:cNvPr id="3" name="Footer Placeholder 2">
+      <p:pic>
+        <p:nvPicPr>
+          <p:cNvPr id="6" name="Content Placeholder 5">
             <a:extLst>
               <a:ext uri="{FF2B5EF4-FFF2-40B4-BE49-F238E27FC236}">
-                <a16:creationId xmlns:a16="http://schemas.microsoft.com/office/drawing/2014/main" id="{A496DDDD-1002-4DFB-B9B2-82AD7DC2FB5C}"/>
-              </a:ext>
-            </a:extLst>
-          </p:cNvPr>
-          <p:cNvSpPr>
-            <a:spLocks noGrp="1"/>
-          </p:cNvSpPr>
-          <p:nvPr>
-            <p:ph type="ftr" sz="quarter" idx="10"/>
-          </p:nvPr>
-        </p:nvSpPr>
-        <p:spPr/>
-        <p:txBody>
-          <a:bodyPr/>
-          <a:lstStyle/>
-          <a:p>
-            <a:pPr>
-              <a:defRPr/>
-            </a:pPr>
-            <a:endParaRPr lang="de-DE"/>
-          </a:p>
-          <a:p>
-            <a:pPr>
-              <a:defRPr/>
-            </a:pPr>
-            <a:endParaRPr lang="de-DE"/>
-          </a:p>
-        </p:txBody>
-      </p:sp>
-      <p:sp>
-        <p:nvSpPr>
-          <p:cNvPr id="4" name="Title 3">
-            <a:extLst>
-              <a:ext uri="{FF2B5EF4-FFF2-40B4-BE49-F238E27FC236}">
-                <a16:creationId xmlns:a16="http://schemas.microsoft.com/office/drawing/2014/main" id="{99420383-D83C-4FB6-817E-5CB6991A7038}"/>
-              </a:ext>
-            </a:extLst>
-          </p:cNvPr>
-          <p:cNvSpPr>
-            <a:spLocks noGrp="1"/>
-          </p:cNvSpPr>
-          <p:nvPr>
-            <p:ph type="title"/>
-          </p:nvPr>
-        </p:nvSpPr>
-        <p:spPr>
-          <a:xfrm>
-            <a:off x="254075" y="432679"/>
-            <a:ext cx="6877050" cy="838200"/>
-          </a:xfrm>
-        </p:spPr>
-        <p:txBody>
-          <a:bodyPr/>
-          <a:lstStyle/>
-          <a:p>
-            <a:r>
-              <a:rPr lang="en-US" dirty="0"/>
-              <a:t>Overall methodology </a:t>
-            </a:r>
-          </a:p>
-        </p:txBody>
-      </p:sp>
-      <p:pic>
-        <p:nvPicPr>
-          <p:cNvPr id="131" name="Picture 130">
-            <a:extLst>
-              <a:ext uri="{FF2B5EF4-FFF2-40B4-BE49-F238E27FC236}">
-                <a16:creationId xmlns:a16="http://schemas.microsoft.com/office/drawing/2014/main" id="{B3FDC6A5-C72E-4938-84CC-9EF3A08EBC13}"/>
+                <a16:creationId xmlns:a16="http://schemas.microsoft.com/office/drawing/2014/main" id="{090B0011-CD01-4D31-93BD-9D45BA0BF002}"/>
               </a:ext>
             </a:extLst>
           </p:cNvPr>
           <p:cNvPicPr>
-            <a:picLocks noChangeAspect="1"/>
+            <a:picLocks noGrp="1" noChangeAspect="1"/>
           </p:cNvPicPr>
-          <p:nvPr/>
+          <p:nvPr>
+            <p:ph idx="1"/>
+          </p:nvPr>
         </p:nvPicPr>
-        <p:blipFill rotWithShape="1">
-          <a:blip r:embed="rId3">
+        <p:blipFill>
+          <a:blip r:embed="rId2" cstate="print">
             <a:extLst>
               <a:ext uri="{28A0092B-C50C-407E-A947-70E740481C1C}">
                 <a14:useLocalDpi xmlns:a14="http://schemas.microsoft.com/office/drawing/2010/main" val="0"/>
               </a:ext>
             </a:extLst>
           </a:blip>
-          <a:srcRect l="12988" t="8404" r="7476" b="7556"/>
-          <a:stretch/>
+          <a:stretch>
+            <a:fillRect/>
+          </a:stretch>
         </p:blipFill>
         <p:spPr>
           <a:xfrm>
-            <a:off x="250824" y="1412775"/>
-            <a:ext cx="8137599" cy="4608492"/>
+            <a:off x="1060349" y="1484313"/>
+            <a:ext cx="7021715" cy="4968875"/>
           </a:xfrm>
-          <a:prstGeom prst="rect">
-            <a:avLst/>
-          </a:prstGeom>
         </p:spPr>
       </p:pic>
-      <p:pic>
-        <p:nvPicPr>
-          <p:cNvPr id="134" name="Picture 295">
+      <p:sp>
+        <p:nvSpPr>
+          <p:cNvPr id="3" name="Footer Placeholder 2">
             <a:extLst>
               <a:ext uri="{FF2B5EF4-FFF2-40B4-BE49-F238E27FC236}">
-                <a16:creationId xmlns:a16="http://schemas.microsoft.com/office/drawing/2014/main" id="{7CA197AC-CA2A-4DBD-8057-8A8F879B0682}"/>
+                <a16:creationId xmlns:a16="http://schemas.microsoft.com/office/drawing/2014/main" id="{D0960B77-6471-485F-8EE6-AE36F1D15405}"/>
               </a:ext>
             </a:extLst>
           </p:cNvPr>
-          <p:cNvPicPr>
-            <a:picLocks noChangeAspect="1" noChangeArrowheads="1"/>
-          </p:cNvPicPr>
-          <p:nvPr/>
-        </p:nvPicPr>
-        <p:blipFill rotWithShape="1">
-          <a:blip r:embed="rId4" cstate="print">
+          <p:cNvSpPr>
+            <a:spLocks noGrp="1"/>
+          </p:cNvSpPr>
+          <p:nvPr>
+            <p:ph type="ftr" sz="quarter" idx="10"/>
+          </p:nvPr>
+        </p:nvSpPr>
+        <p:spPr/>
+        <p:txBody>
+          <a:bodyPr/>
+          <a:lstStyle/>
+          <a:p>
+            <a:pPr>
+              <a:defRPr/>
+            </a:pPr>
+            <a:endParaRPr lang="de-DE"/>
+          </a:p>
+          <a:p>
+            <a:pPr>
+              <a:defRPr/>
+            </a:pPr>
+            <a:endParaRPr lang="de-DE"/>
+          </a:p>
+        </p:txBody>
+      </p:sp>
+      <p:sp>
+        <p:nvSpPr>
+          <p:cNvPr id="7" name="Title 3">
             <a:extLst>
-              <a:ext uri="{28A0092B-C50C-407E-A947-70E740481C1C}">
-                <a14:useLocalDpi xmlns:a14="http://schemas.microsoft.com/office/drawing/2010/main" val="0"/>
+              <a:ext uri="{FF2B5EF4-FFF2-40B4-BE49-F238E27FC236}">
+                <a16:creationId xmlns:a16="http://schemas.microsoft.com/office/drawing/2014/main" id="{2C861FF2-3478-4CF8-B2D4-86FD4F42C3F3}"/>
               </a:ext>
             </a:extLst>
-          </a:blip>
-          <a:srcRect l="-2969" t="-3" r="-1912" b="49539"/>
-          <a:stretch/>
-        </p:blipFill>
-        <p:spPr bwMode="auto">
+          </p:cNvPr>
+          <p:cNvSpPr>
+            <a:spLocks noGrp="1"/>
+          </p:cNvSpPr>
+          <p:nvPr>
+            <p:ph type="title"/>
+          </p:nvPr>
+        </p:nvSpPr>
+        <p:spPr>
           <a:xfrm>
-            <a:off x="4427984" y="5528938"/>
-            <a:ext cx="955358" cy="828671"/>
+            <a:off x="254075" y="488950"/>
+            <a:ext cx="6877050" cy="838200"/>
           </a:xfrm>
-          <a:prstGeom prst="rect">
-            <a:avLst/>
-          </a:prstGeom>
-          <a:noFill/>
-          <a:extLst>
-            <a:ext uri="{909E8E84-426E-40DD-AFC4-6F175D3DCCD1}">
-              <a14:hiddenFill xmlns:a14="http://schemas.microsoft.com/office/drawing/2010/main">
-                <a:solidFill>
-                  <a:srgbClr val="FFFFFF"/>
-                </a:solidFill>
-              </a14:hiddenFill>
-            </a:ext>
-          </a:extLst>
         </p:spPr>
-      </p:pic>
+        <p:txBody>
+          <a:bodyPr/>
+          <a:lstStyle/>
+          <a:p>
+            <a:r>
+              <a:rPr lang="en-US" dirty="0"/>
+              <a:t> Study Area</a:t>
+            </a:r>
+          </a:p>
+        </p:txBody>
+      </p:sp>
     </p:spTree>
     <p:extLst>
       <p:ext uri="{BB962C8B-B14F-4D97-AF65-F5344CB8AC3E}">
-        <p14:creationId xmlns:p14="http://schemas.microsoft.com/office/powerpoint/2010/main" val="827824677"/>
+        <p14:creationId xmlns:p14="http://schemas.microsoft.com/office/powerpoint/2010/main" val="3369880613"/>
       </p:ext>
     </p:extLst>
   </p:cSld>
@@ -9441,294 +10604,10 @@
       </p:grpSpPr>
       <p:sp>
         <p:nvSpPr>
-          <p:cNvPr id="2" name="Text Placeholder 1">
-            <a:extLst>
-              <a:ext uri="{FF2B5EF4-FFF2-40B4-BE49-F238E27FC236}">
-                <a16:creationId xmlns:a16="http://schemas.microsoft.com/office/drawing/2014/main" id="{327FB035-4EC4-45C3-8B2F-AED423F29F13}"/>
-              </a:ext>
-            </a:extLst>
-          </p:cNvPr>
-          <p:cNvSpPr>
-            <a:spLocks noGrp="1"/>
-          </p:cNvSpPr>
-          <p:nvPr>
-            <p:ph type="body" idx="1"/>
-          </p:nvPr>
-        </p:nvSpPr>
-        <p:spPr/>
-        <p:txBody>
-          <a:bodyPr/>
-          <a:lstStyle/>
-          <a:p>
-            <a:pPr marL="514350" marR="0" lvl="0" indent="-514350" fontAlgn="base">
-              <a:lnSpc>
-                <a:spcPct val="107000"/>
-              </a:lnSpc>
-              <a:spcBef>
-                <a:spcPts val="0"/>
-              </a:spcBef>
-              <a:spcAft>
-                <a:spcPts val="0"/>
-              </a:spcAft>
-              <a:buSzPts val="1000"/>
-              <a:buFont typeface="+mj-lt"/>
-              <a:buAutoNum type="romanUcPeriod"/>
-              <a:tabLst>
-                <a:tab pos="457200" algn="l"/>
-              </a:tabLst>
-            </a:pPr>
-            <a:r>
-              <a:rPr lang="en-GB" dirty="0">
-                <a:solidFill>
-                  <a:srgbClr val="000000"/>
-                </a:solidFill>
-                <a:effectLst/>
-                <a:cs typeface="Times New Roman" panose="02020603050405020304" pitchFamily="18" charset="0"/>
-              </a:rPr>
-              <a:t>Chlorophyl-a Geographical Maps associating the occurrence of the Harmful Algal Blooms and Cyanobacteria.</a:t>
-            </a:r>
-          </a:p>
-          <a:p>
-            <a:pPr marL="514350" marR="0" lvl="0" indent="-514350" fontAlgn="base">
-              <a:lnSpc>
-                <a:spcPct val="107000"/>
-              </a:lnSpc>
-              <a:spcBef>
-                <a:spcPts val="0"/>
-              </a:spcBef>
-              <a:spcAft>
-                <a:spcPts val="0"/>
-              </a:spcAft>
-              <a:buSzPts val="1000"/>
-              <a:buFont typeface="+mj-lt"/>
-              <a:buAutoNum type="romanUcPeriod"/>
-              <a:tabLst>
-                <a:tab pos="457200" algn="l"/>
-              </a:tabLst>
-            </a:pPr>
-            <a:endParaRPr lang="en-GB" dirty="0">
-              <a:solidFill>
-                <a:srgbClr val="000000"/>
-              </a:solidFill>
-              <a:effectLst/>
-              <a:cs typeface="Times New Roman" panose="02020603050405020304" pitchFamily="18" charset="0"/>
-            </a:endParaRPr>
-          </a:p>
-          <a:p>
-            <a:pPr marL="514350" marR="0" lvl="0" indent="-514350" fontAlgn="base">
-              <a:lnSpc>
-                <a:spcPct val="107000"/>
-              </a:lnSpc>
-              <a:spcBef>
-                <a:spcPts val="0"/>
-              </a:spcBef>
-              <a:spcAft>
-                <a:spcPts val="0"/>
-              </a:spcAft>
-              <a:buSzPts val="1000"/>
-              <a:buFont typeface="+mj-lt"/>
-              <a:buAutoNum type="romanUcPeriod"/>
-              <a:tabLst>
-                <a:tab pos="457200" algn="l"/>
-              </a:tabLst>
-            </a:pPr>
-            <a:r>
-              <a:rPr lang="en-GB" dirty="0">
-                <a:solidFill>
-                  <a:srgbClr val="000000"/>
-                </a:solidFill>
-                <a:effectLst/>
-                <a:cs typeface="Times New Roman" panose="02020603050405020304" pitchFamily="18" charset="0"/>
-              </a:rPr>
-              <a:t>Automated system that monitors and reports geo-tagged data</a:t>
-            </a:r>
-          </a:p>
-          <a:p>
-            <a:pPr marL="514350" marR="0" lvl="0" indent="-514350" fontAlgn="base">
-              <a:lnSpc>
-                <a:spcPct val="107000"/>
-              </a:lnSpc>
-              <a:spcBef>
-                <a:spcPts val="0"/>
-              </a:spcBef>
-              <a:spcAft>
-                <a:spcPts val="0"/>
-              </a:spcAft>
-              <a:buSzPts val="1000"/>
-              <a:buFont typeface="+mj-lt"/>
-              <a:buAutoNum type="romanUcPeriod"/>
-              <a:tabLst>
-                <a:tab pos="457200" algn="l"/>
-              </a:tabLst>
-            </a:pPr>
-            <a:endParaRPr lang="en-US" dirty="0">
-              <a:solidFill>
-                <a:srgbClr val="000000"/>
-              </a:solidFill>
-              <a:effectLst/>
-            </a:endParaRPr>
-          </a:p>
-          <a:p>
-            <a:pPr marL="514350" marR="0" lvl="0" indent="-514350" fontAlgn="base">
-              <a:lnSpc>
-                <a:spcPct val="107000"/>
-              </a:lnSpc>
-              <a:spcBef>
-                <a:spcPts val="0"/>
-              </a:spcBef>
-              <a:spcAft>
-                <a:spcPts val="0"/>
-              </a:spcAft>
-              <a:buSzPts val="1000"/>
-              <a:buFont typeface="+mj-lt"/>
-              <a:buAutoNum type="romanUcPeriod"/>
-              <a:tabLst>
-                <a:tab pos="457200" algn="l"/>
-              </a:tabLst>
-            </a:pPr>
-            <a:r>
-              <a:rPr lang="en-GB" dirty="0">
-                <a:solidFill>
-                  <a:srgbClr val="000000"/>
-                </a:solidFill>
-                <a:effectLst/>
-                <a:cs typeface="Times New Roman" panose="02020603050405020304" pitchFamily="18" charset="0"/>
-              </a:rPr>
-              <a:t>Reported confirmation alert Text SMS reporting in near-real time the </a:t>
-            </a:r>
-            <a:r>
-              <a:rPr lang="en-GB" i="1" dirty="0">
-                <a:solidFill>
-                  <a:srgbClr val="000000"/>
-                </a:solidFill>
-                <a:effectLst/>
-                <a:cs typeface="Times New Roman" panose="02020603050405020304" pitchFamily="18" charset="0"/>
-              </a:rPr>
-              <a:t>in-situ </a:t>
-            </a:r>
-            <a:r>
-              <a:rPr lang="en-GB" dirty="0">
-                <a:solidFill>
-                  <a:srgbClr val="000000"/>
-                </a:solidFill>
-                <a:effectLst/>
-                <a:cs typeface="Times New Roman" panose="02020603050405020304" pitchFamily="18" charset="0"/>
-              </a:rPr>
-              <a:t>status from the sensors.</a:t>
-            </a:r>
-          </a:p>
-          <a:p>
-            <a:pPr marL="514350" marR="0" lvl="0" indent="-514350" fontAlgn="base">
-              <a:lnSpc>
-                <a:spcPct val="107000"/>
-              </a:lnSpc>
-              <a:spcBef>
-                <a:spcPts val="0"/>
-              </a:spcBef>
-              <a:spcAft>
-                <a:spcPts val="0"/>
-              </a:spcAft>
-              <a:buSzPts val="1000"/>
-              <a:buFont typeface="+mj-lt"/>
-              <a:buAutoNum type="romanUcPeriod"/>
-              <a:tabLst>
-                <a:tab pos="457200" algn="l"/>
-              </a:tabLst>
-            </a:pPr>
-            <a:endParaRPr lang="en-GB" dirty="0">
-              <a:solidFill>
-                <a:srgbClr val="000000"/>
-              </a:solidFill>
-              <a:cs typeface="Times New Roman" panose="02020603050405020304" pitchFamily="18" charset="0"/>
-            </a:endParaRPr>
-          </a:p>
-          <a:p>
-            <a:pPr marL="514350" marR="0" lvl="0" indent="-514350" fontAlgn="base">
-              <a:lnSpc>
-                <a:spcPct val="107000"/>
-              </a:lnSpc>
-              <a:spcBef>
-                <a:spcPts val="0"/>
-              </a:spcBef>
-              <a:spcAft>
-                <a:spcPts val="0"/>
-              </a:spcAft>
-              <a:buSzPts val="1000"/>
-              <a:buFont typeface="+mj-lt"/>
-              <a:buAutoNum type="romanUcPeriod"/>
-              <a:tabLst>
-                <a:tab pos="457200" algn="l"/>
-              </a:tabLst>
-            </a:pPr>
-            <a:r>
-              <a:rPr lang="en-GB" dirty="0">
-                <a:solidFill>
-                  <a:srgbClr val="000000"/>
-                </a:solidFill>
-                <a:effectLst/>
-                <a:cs typeface="Times New Roman" panose="02020603050405020304" pitchFamily="18" charset="0"/>
-              </a:rPr>
-              <a:t>Time Series predictive model on any looming bloom.</a:t>
-            </a:r>
-          </a:p>
-          <a:p>
-            <a:pPr marL="514350" marR="0" lvl="0" indent="-514350" fontAlgn="base">
-              <a:lnSpc>
-                <a:spcPct val="107000"/>
-              </a:lnSpc>
-              <a:spcBef>
-                <a:spcPts val="0"/>
-              </a:spcBef>
-              <a:spcAft>
-                <a:spcPts val="0"/>
-              </a:spcAft>
-              <a:buSzPts val="1000"/>
-              <a:buFont typeface="+mj-lt"/>
-              <a:buAutoNum type="romanUcPeriod"/>
-              <a:tabLst>
-                <a:tab pos="457200" algn="l"/>
-              </a:tabLst>
-            </a:pPr>
-            <a:endParaRPr lang="en-US" dirty="0">
-              <a:solidFill>
-                <a:srgbClr val="000000"/>
-              </a:solidFill>
-              <a:effectLst/>
-            </a:endParaRPr>
-          </a:p>
-          <a:p>
-            <a:pPr marL="0" marR="0" lvl="0" indent="0" fontAlgn="base">
-              <a:lnSpc>
-                <a:spcPct val="107000"/>
-              </a:lnSpc>
-              <a:spcBef>
-                <a:spcPts val="0"/>
-              </a:spcBef>
-              <a:spcAft>
-                <a:spcPts val="0"/>
-              </a:spcAft>
-              <a:buSzPts val="1000"/>
-              <a:tabLst>
-                <a:tab pos="457200" algn="l"/>
-              </a:tabLst>
-            </a:pPr>
-            <a:endParaRPr lang="en-US" sz="1800" dirty="0">
-              <a:solidFill>
-                <a:srgbClr val="000000"/>
-              </a:solidFill>
-              <a:effectLst/>
-              <a:latin typeface="Calibri" panose="020F0502020204030204" pitchFamily="34" charset="0"/>
-              <a:ea typeface="Calibri" panose="020F0502020204030204" pitchFamily="34" charset="0"/>
-            </a:endParaRPr>
-          </a:p>
-        </p:txBody>
-      </p:sp>
-      <p:sp>
-        <p:nvSpPr>
           <p:cNvPr id="3" name="Footer Placeholder 2">
             <a:extLst>
               <a:ext uri="{FF2B5EF4-FFF2-40B4-BE49-F238E27FC236}">
-                <a16:creationId xmlns:a16="http://schemas.microsoft.com/office/drawing/2014/main" id="{5D13DC20-297E-417D-8DFC-DC2FCABB764B}"/>
+                <a16:creationId xmlns:a16="http://schemas.microsoft.com/office/drawing/2014/main" id="{A496DDDD-1002-4DFB-B9B2-82AD7DC2FB5C}"/>
               </a:ext>
             </a:extLst>
           </p:cNvPr>
@@ -9762,7 +10641,7 @@
           <p:cNvPr id="4" name="Title 3">
             <a:extLst>
               <a:ext uri="{FF2B5EF4-FFF2-40B4-BE49-F238E27FC236}">
-                <a16:creationId xmlns:a16="http://schemas.microsoft.com/office/drawing/2014/main" id="{5EDBB8AF-905E-406C-B321-B53DDA2D2878}"/>
+                <a16:creationId xmlns:a16="http://schemas.microsoft.com/office/drawing/2014/main" id="{99420383-D83C-4FB6-817E-5CB6991A7038}"/>
               </a:ext>
             </a:extLst>
           </p:cNvPr>
@@ -9773,22 +10652,148 @@
             <p:ph type="title"/>
           </p:nvPr>
         </p:nvSpPr>
-        <p:spPr/>
+        <p:spPr>
+          <a:xfrm>
+            <a:off x="254075" y="432679"/>
+            <a:ext cx="6877050" cy="838200"/>
+          </a:xfrm>
+        </p:spPr>
         <p:txBody>
           <a:bodyPr/>
           <a:lstStyle/>
           <a:p>
             <a:r>
               <a:rPr lang="en-US" dirty="0"/>
-              <a:t>Expected Results</a:t>
-            </a:r>
-          </a:p>
-        </p:txBody>
-      </p:sp>
+              <a:t>Overall methodology </a:t>
+            </a:r>
+          </a:p>
+        </p:txBody>
+      </p:sp>
+      <p:pic>
+        <p:nvPicPr>
+          <p:cNvPr id="5" name="Picture 4">
+            <a:extLst>
+              <a:ext uri="{FF2B5EF4-FFF2-40B4-BE49-F238E27FC236}">
+                <a16:creationId xmlns:a16="http://schemas.microsoft.com/office/drawing/2014/main" id="{F1BF4F5D-8A59-4C85-9AFF-2CCE9BB27ECD}"/>
+              </a:ext>
+            </a:extLst>
+          </p:cNvPr>
+          <p:cNvPicPr>
+            <a:picLocks noChangeAspect="1"/>
+          </p:cNvPicPr>
+          <p:nvPr/>
+        </p:nvPicPr>
+        <p:blipFill>
+          <a:blip r:embed="rId3"/>
+          <a:stretch>
+            <a:fillRect/>
+          </a:stretch>
+        </p:blipFill>
+        <p:spPr>
+          <a:xfrm>
+            <a:off x="971600" y="1281765"/>
+            <a:ext cx="6667500" cy="4810125"/>
+          </a:xfrm>
+          <a:prstGeom prst="rect">
+            <a:avLst/>
+          </a:prstGeom>
+        </p:spPr>
+      </p:pic>
+      <p:pic>
+        <p:nvPicPr>
+          <p:cNvPr id="8" name="Picture 295">
+            <a:extLst>
+              <a:ext uri="{FF2B5EF4-FFF2-40B4-BE49-F238E27FC236}">
+                <a16:creationId xmlns:a16="http://schemas.microsoft.com/office/drawing/2014/main" id="{3B4968FF-A3D1-4F82-91B0-2C6A58864EC9}"/>
+              </a:ext>
+            </a:extLst>
+          </p:cNvPr>
+          <p:cNvPicPr>
+            <a:picLocks noChangeAspect="1" noChangeArrowheads="1"/>
+          </p:cNvPicPr>
+          <p:nvPr/>
+        </p:nvPicPr>
+        <p:blipFill rotWithShape="1">
+          <a:blip r:embed="rId4" cstate="print">
+            <a:extLst>
+              <a:ext uri="{28A0092B-C50C-407E-A947-70E740481C1C}">
+                <a14:useLocalDpi xmlns:a14="http://schemas.microsoft.com/office/drawing/2010/main" val="0"/>
+              </a:ext>
+            </a:extLst>
+          </a:blip>
+          <a:srcRect l="-2969" t="-3" r="-1912" b="49539"/>
+          <a:stretch/>
+        </p:blipFill>
+        <p:spPr bwMode="auto">
+          <a:xfrm>
+            <a:off x="4932040" y="5688440"/>
+            <a:ext cx="955358" cy="828671"/>
+          </a:xfrm>
+          <a:prstGeom prst="rect">
+            <a:avLst/>
+          </a:prstGeom>
+          <a:noFill/>
+          <a:extLst>
+            <a:ext uri="{909E8E84-426E-40DD-AFC4-6F175D3DCCD1}">
+              <a14:hiddenFill xmlns:a14="http://schemas.microsoft.com/office/drawing/2010/main">
+                <a:solidFill>
+                  <a:srgbClr val="FFFFFF"/>
+                </a:solidFill>
+              </a14:hiddenFill>
+            </a:ext>
+          </a:extLst>
+        </p:spPr>
+      </p:pic>
+      <p:cxnSp>
+        <p:nvCxnSpPr>
+          <p:cNvPr id="9" name="Connector: Elbow 8">
+            <a:extLst>
+              <a:ext uri="{FF2B5EF4-FFF2-40B4-BE49-F238E27FC236}">
+                <a16:creationId xmlns:a16="http://schemas.microsoft.com/office/drawing/2014/main" id="{81AA5AA3-9403-4325-92A6-37851D3CE648}"/>
+              </a:ext>
+            </a:extLst>
+          </p:cNvPr>
+          <p:cNvCxnSpPr>
+            <a:cxnSpLocks/>
+          </p:cNvCxnSpPr>
+          <p:nvPr/>
+        </p:nvCxnSpPr>
+        <p:spPr>
+          <a:xfrm>
+            <a:off x="4432971" y="6142915"/>
+            <a:ext cx="466344" cy="200599"/>
+          </a:xfrm>
+          <a:prstGeom prst="bentConnector3">
+            <a:avLst>
+              <a:gd name="adj1" fmla="val 1691"/>
+            </a:avLst>
+          </a:prstGeom>
+          <a:ln>
+            <a:solidFill>
+              <a:srgbClr val="00B0F0"/>
+            </a:solidFill>
+            <a:tailEnd type="triangle"/>
+          </a:ln>
+        </p:spPr>
+        <p:style>
+          <a:lnRef idx="1">
+            <a:schemeClr val="accent1"/>
+          </a:lnRef>
+          <a:fillRef idx="0">
+            <a:schemeClr val="accent1"/>
+          </a:fillRef>
+          <a:effectRef idx="0">
+            <a:schemeClr val="accent1"/>
+          </a:effectRef>
+          <a:fontRef idx="minor">
+            <a:schemeClr val="tx1"/>
+          </a:fontRef>
+        </p:style>
+      </p:cxnSp>
     </p:spTree>
     <p:extLst>
       <p:ext uri="{BB962C8B-B14F-4D97-AF65-F5344CB8AC3E}">
-        <p14:creationId xmlns:p14="http://schemas.microsoft.com/office/powerpoint/2010/main" val="136174935"/>
+        <p14:creationId xmlns:p14="http://schemas.microsoft.com/office/powerpoint/2010/main" val="827824677"/>
       </p:ext>
     </p:extLst>
   </p:cSld>

</xml_diff>

<commit_message>
:fire:, :pencil:, :books: :camera: :hammer: Write-yups reshape
</commit_message>
<xml_diff>
--- a/MY PRESENTATION.pptx
+++ b/MY PRESENTATION.pptx
@@ -8780,7 +8780,7 @@
             </a:pPr>
             <a:r>
               <a:rPr lang="en-GB" sz="2200" b="0" dirty="0"/>
-              <a:t>Topic is about</a:t>
+              <a:t>Th</a:t>
             </a:r>
           </a:p>
           <a:p>
@@ -9124,18 +9124,7 @@
             </a:pPr>
             <a:r>
               <a:rPr lang="en-GB" sz="2200" b="0" dirty="0"/>
-              <a:t>By now you’ve identified gaps in the past studies</a:t>
-            </a:r>
-            <a:endParaRPr lang="en-US" sz="2200" b="0" dirty="0"/>
-          </a:p>
-          <a:p>
-            <a:pPr marL="342900" lvl="0" indent="-342900">
-              <a:buFont typeface="Arial" panose="020B0604020202020204" pitchFamily="34" charset="0"/>
-              <a:buChar char="•"/>
-            </a:pPr>
-            <a:r>
-              <a:rPr lang="en-GB" sz="2200" b="0" dirty="0"/>
-              <a:t>Clearly outline it here </a:t>
+              <a:t>Clearly outline the research gaps here.</a:t>
             </a:r>
             <a:endParaRPr lang="en-US" sz="2200" b="0" dirty="0"/>
           </a:p>
@@ -9779,7 +9768,7 @@
           <p:nvPr>
             <p:extLst>
               <p:ext uri="{D42A27DB-BD31-4B8C-83A1-F6EECF244321}">
-                <p14:modId xmlns:p14="http://schemas.microsoft.com/office/powerpoint/2010/main" val="386310816"/>
+                <p14:modId xmlns:p14="http://schemas.microsoft.com/office/powerpoint/2010/main" val="2754313095"/>
               </p:ext>
             </p:extLst>
           </p:nvPr>
@@ -10061,7 +10050,13 @@
                     <a:p>
                       <a:r>
                         <a:rPr lang="en-US" dirty="0"/>
-                        <a:t>In-Situ &amp; Meteorology Data</a:t>
+                        <a:t>- Meteorology Data</a:t>
+                      </a:r>
+                    </a:p>
+                    <a:p>
+                      <a:r>
+                        <a:rPr lang="en-US" dirty="0"/>
+                        <a:t>-In-Situ</a:t>
                       </a:r>
                     </a:p>
                   </a:txBody>
@@ -10091,7 +10086,7 @@
                       </a:pPr>
                       <a:r>
                         <a:rPr lang="en-US" dirty="0"/>
-                        <a:t>Lake Victoria Water Quality Mgt</a:t>
+                        <a:t>-Lake Victoria Water Quality Mgt</a:t>
                       </a:r>
                     </a:p>
                     <a:p>
@@ -10113,8 +10108,12 @@
                         <a:defRPr/>
                       </a:pPr>
                       <a:r>
+                        <a:rPr lang="en-US"/>
+                        <a:t>-My </a:t>
+                      </a:r>
+                      <a:r>
                         <a:rPr lang="en-US" dirty="0"/>
-                        <a:t>My Automated </a:t>
+                        <a:t>Automated </a:t>
                       </a:r>
                       <a:r>
                         <a:rPr lang="en-US" i="1" dirty="0"/>
@@ -10310,13 +10309,8 @@
                     <a:p>
                       <a:r>
                         <a:rPr lang="en-US" dirty="0"/>
-                        <a:t>QGIS</a:t>
+                        <a:t>QGIS, R &amp; Python</a:t>
                       </a:r>
-                      <a:r>
-                        <a:rPr lang="en-US"/>
-                        <a:t>, R &amp; Python</a:t>
-                      </a:r>
-                      <a:endParaRPr lang="en-US" dirty="0"/>
                     </a:p>
                   </a:txBody>
                   <a:tcPr/>

</xml_diff>

<commit_message>
:fire:, :pencil:, :books: :camera: :hammer: Write-ups reshape
</commit_message>
<xml_diff>
--- a/MY PRESENTATION.pptx
+++ b/MY PRESENTATION.pptx
@@ -9123,10 +9123,9 @@
               <a:buChar char="•"/>
             </a:pPr>
             <a:r>
-              <a:rPr lang="en-GB" sz="2200" b="0" dirty="0"/>
-              <a:t>Clearly outline the research gaps here.</a:t>
-            </a:r>
-            <a:endParaRPr lang="en-US" sz="2200" b="0" dirty="0"/>
+              <a:rPr lang="en-US" sz="2200" b="0" dirty="0"/>
+              <a:t>Previous studies on the same problem by </a:t>
+            </a:r>
           </a:p>
           <a:p>
             <a:pPr marL="342900" lvl="0" indent="-342900">
@@ -9768,7 +9767,7 @@
           <p:nvPr>
             <p:extLst>
               <p:ext uri="{D42A27DB-BD31-4B8C-83A1-F6EECF244321}">
-                <p14:modId xmlns:p14="http://schemas.microsoft.com/office/powerpoint/2010/main" val="2754313095"/>
+                <p14:modId xmlns:p14="http://schemas.microsoft.com/office/powerpoint/2010/main" val="1430014975"/>
               </p:ext>
             </p:extLst>
           </p:nvPr>
@@ -10108,12 +10107,8 @@
                         <a:defRPr/>
                       </a:pPr>
                       <a:r>
-                        <a:rPr lang="en-US"/>
-                        <a:t>-My </a:t>
-                      </a:r>
-                      <a:r>
                         <a:rPr lang="en-US" dirty="0"/>
-                        <a:t>Automated </a:t>
+                        <a:t>-My Automated </a:t>
                       </a:r>
                       <a:r>
                         <a:rPr lang="en-US" i="1" dirty="0"/>

</xml_diff>

<commit_message>
:fire:, :pencil:, :books: :camera: :hammer: Intro
</commit_message>
<xml_diff>
--- a/MY PRESENTATION.pptx
+++ b/MY PRESENTATION.pptx
@@ -2926,7 +2926,7 @@
                 <a:ea typeface="Verdana" panose="020B0604030504040204" pitchFamily="34" charset="0"/>
                 <a:cs typeface="Verdana" panose="020B0604030504040204" pitchFamily="34" charset="0"/>
               </a:rPr>
-              <a:t>24-May-21</a:t>
+              <a:t>25-May-21</a:t>
             </a:fld>
             <a:endParaRPr lang="de-DE" sz="1000" dirty="0">
               <a:solidFill>
@@ -7567,7 +7567,7 @@
         <p:spPr>
           <a:xfrm>
             <a:off x="251520" y="332656"/>
-            <a:ext cx="7056784" cy="2061294"/>
+            <a:ext cx="7272808" cy="2061294"/>
           </a:xfrm>
         </p:spPr>
         <p:txBody>
@@ -7575,8 +7575,8 @@
           <a:lstStyle/>
           <a:p>
             <a:pPr algn="l" eaLnBrk="1" hangingPunct="1"/>
-            <a:r>
-              <a:rPr lang="en-GB" sz="2200" b="1" u="sng" dirty="0">
+            <a:br>
+              <a:rPr lang="en-GB" b="1" u="sng" dirty="0">
                 <a:solidFill>
                   <a:srgbClr val="000000"/>
                 </a:solidFill>
@@ -7585,10 +7585,131 @@
                 <a:ea typeface="Times New Roman" panose="02020603050405020304" pitchFamily="18" charset="0"/>
                 <a:cs typeface="Times New Roman" panose="02020603050405020304" pitchFamily="18" charset="0"/>
               </a:rPr>
-              <a:t>Spatiotemporal Remote Sensing, automated </a:t>
-            </a:r>
-            <a:r>
-              <a:rPr lang="en-GB" sz="2200" b="1" i="1" u="sng" dirty="0">
+            </a:br>
+            <a:br>
+              <a:rPr lang="en-GB" b="1" u="sng" dirty="0">
+                <a:solidFill>
+                  <a:srgbClr val="000000"/>
+                </a:solidFill>
+                <a:effectLst/>
+                <a:latin typeface="Verdana" panose="020B0604030504040204" pitchFamily="34" charset="0"/>
+                <a:ea typeface="Times New Roman" panose="02020603050405020304" pitchFamily="18" charset="0"/>
+                <a:cs typeface="Times New Roman" panose="02020603050405020304" pitchFamily="18" charset="0"/>
+              </a:rPr>
+            </a:br>
+            <a:br>
+              <a:rPr lang="en-GB" b="1" u="sng" dirty="0">
+                <a:solidFill>
+                  <a:srgbClr val="000000"/>
+                </a:solidFill>
+                <a:effectLst/>
+                <a:latin typeface="Verdana" panose="020B0604030504040204" pitchFamily="34" charset="0"/>
+                <a:ea typeface="Times New Roman" panose="02020603050405020304" pitchFamily="18" charset="0"/>
+                <a:cs typeface="Times New Roman" panose="02020603050405020304" pitchFamily="18" charset="0"/>
+              </a:rPr>
+            </a:br>
+            <a:br>
+              <a:rPr lang="en-GB" b="1" u="sng" dirty="0">
+                <a:solidFill>
+                  <a:srgbClr val="000000"/>
+                </a:solidFill>
+                <a:effectLst/>
+                <a:latin typeface="Verdana" panose="020B0604030504040204" pitchFamily="34" charset="0"/>
+                <a:ea typeface="Times New Roman" panose="02020603050405020304" pitchFamily="18" charset="0"/>
+                <a:cs typeface="Times New Roman" panose="02020603050405020304" pitchFamily="18" charset="0"/>
+              </a:rPr>
+            </a:br>
+            <a:br>
+              <a:rPr lang="en-GB" b="1" u="sng" dirty="0">
+                <a:solidFill>
+                  <a:srgbClr val="000000"/>
+                </a:solidFill>
+                <a:effectLst/>
+                <a:latin typeface="Verdana" panose="020B0604030504040204" pitchFamily="34" charset="0"/>
+                <a:ea typeface="Times New Roman" panose="02020603050405020304" pitchFamily="18" charset="0"/>
+                <a:cs typeface="Times New Roman" panose="02020603050405020304" pitchFamily="18" charset="0"/>
+              </a:rPr>
+            </a:br>
+            <a:br>
+              <a:rPr lang="en-GB" b="1" u="sng" dirty="0">
+                <a:solidFill>
+                  <a:srgbClr val="000000"/>
+                </a:solidFill>
+                <a:effectLst/>
+                <a:latin typeface="Verdana" panose="020B0604030504040204" pitchFamily="34" charset="0"/>
+                <a:ea typeface="Times New Roman" panose="02020603050405020304" pitchFamily="18" charset="0"/>
+                <a:cs typeface="Times New Roman" panose="02020603050405020304" pitchFamily="18" charset="0"/>
+              </a:rPr>
+            </a:br>
+            <a:br>
+              <a:rPr lang="en-GB" b="1" u="sng" dirty="0">
+                <a:solidFill>
+                  <a:srgbClr val="000000"/>
+                </a:solidFill>
+                <a:effectLst/>
+                <a:latin typeface="Verdana" panose="020B0604030504040204" pitchFamily="34" charset="0"/>
+                <a:ea typeface="Times New Roman" panose="02020603050405020304" pitchFamily="18" charset="0"/>
+                <a:cs typeface="Times New Roman" panose="02020603050405020304" pitchFamily="18" charset="0"/>
+              </a:rPr>
+            </a:br>
+            <a:br>
+              <a:rPr lang="en-GB" b="1" u="sng" dirty="0">
+                <a:solidFill>
+                  <a:srgbClr val="000000"/>
+                </a:solidFill>
+                <a:effectLst/>
+                <a:latin typeface="Verdana" panose="020B0604030504040204" pitchFamily="34" charset="0"/>
+                <a:ea typeface="Times New Roman" panose="02020603050405020304" pitchFamily="18" charset="0"/>
+                <a:cs typeface="Times New Roman" panose="02020603050405020304" pitchFamily="18" charset="0"/>
+              </a:rPr>
+            </a:br>
+            <a:br>
+              <a:rPr lang="en-GB" b="1" u="sng" dirty="0">
+                <a:solidFill>
+                  <a:srgbClr val="000000"/>
+                </a:solidFill>
+                <a:effectLst/>
+                <a:latin typeface="Verdana" panose="020B0604030504040204" pitchFamily="34" charset="0"/>
+                <a:ea typeface="Times New Roman" panose="02020603050405020304" pitchFamily="18" charset="0"/>
+                <a:cs typeface="Times New Roman" panose="02020603050405020304" pitchFamily="18" charset="0"/>
+              </a:rPr>
+            </a:br>
+            <a:br>
+              <a:rPr lang="en-GB" b="1" u="sng" dirty="0">
+                <a:solidFill>
+                  <a:srgbClr val="000000"/>
+                </a:solidFill>
+                <a:effectLst/>
+                <a:latin typeface="Verdana" panose="020B0604030504040204" pitchFamily="34" charset="0"/>
+                <a:ea typeface="Times New Roman" panose="02020603050405020304" pitchFamily="18" charset="0"/>
+                <a:cs typeface="Times New Roman" panose="02020603050405020304" pitchFamily="18" charset="0"/>
+              </a:rPr>
+            </a:br>
+            <a:br>
+              <a:rPr lang="en-GB" b="1" u="sng" dirty="0">
+                <a:solidFill>
+                  <a:srgbClr val="000000"/>
+                </a:solidFill>
+                <a:effectLst/>
+                <a:latin typeface="Verdana" panose="020B0604030504040204" pitchFamily="34" charset="0"/>
+                <a:ea typeface="Times New Roman" panose="02020603050405020304" pitchFamily="18" charset="0"/>
+                <a:cs typeface="Times New Roman" panose="02020603050405020304" pitchFamily="18" charset="0"/>
+              </a:rPr>
+            </a:br>
+            <a:r>
+              <a:rPr lang="en-GB" b="1" u="sng" dirty="0">
+                <a:solidFill>
+                  <a:srgbClr val="000000"/>
+                </a:solidFill>
+                <a:effectLst/>
+                <a:latin typeface="Verdana" panose="020B0604030504040204" pitchFamily="34" charset="0"/>
+                <a:ea typeface="Times New Roman" panose="02020603050405020304" pitchFamily="18" charset="0"/>
+                <a:cs typeface="Times New Roman" panose="02020603050405020304" pitchFamily="18" charset="0"/>
+              </a:rPr>
+              <a:t>Automated </a:t>
+            </a:r>
+            <a:r>
+              <a:rPr lang="en-GB" b="1" i="1" u="sng" dirty="0">
                 <a:solidFill>
                   <a:srgbClr val="000000"/>
                 </a:solidFill>
@@ -7600,7 +7721,7 @@
               <a:t>in-situ </a:t>
             </a:r>
             <a:r>
-              <a:rPr lang="en-GB" sz="2200" b="1" u="sng" dirty="0">
+              <a:rPr lang="en-GB" b="1" u="sng" dirty="0">
                 <a:solidFill>
                   <a:srgbClr val="000000"/>
                 </a:solidFill>
@@ -7609,31 +7730,15 @@
                 <a:ea typeface="Times New Roman" panose="02020603050405020304" pitchFamily="18" charset="0"/>
                 <a:cs typeface="Times New Roman" panose="02020603050405020304" pitchFamily="18" charset="0"/>
               </a:rPr>
-              <a:t>IoT</a:t>
-            </a:r>
-            <a:r>
-              <a:rPr lang="en-GB" sz="2200" b="1" i="1" u="sng" dirty="0">
-                <a:solidFill>
-                  <a:srgbClr val="000000"/>
-                </a:solidFill>
+              <a:t>sensors &amp; Spatiotemporal Monitoring &amp; Machine Learning prediction of Harmful Algal Blooms</a:t>
+            </a:r>
+            <a:r>
+              <a:rPr lang="en-US" sz="1600" dirty="0">
                 <a:effectLst/>
-                <a:latin typeface="Verdana" panose="020B0604030504040204" pitchFamily="34" charset="0"/>
-                <a:ea typeface="Times New Roman" panose="02020603050405020304" pitchFamily="18" charset="0"/>
-                <a:cs typeface="Times New Roman" panose="02020603050405020304" pitchFamily="18" charset="0"/>
+                <a:latin typeface="Calibri" panose="020F0502020204030204" pitchFamily="34" charset="0"/>
+                <a:ea typeface="Calibri" panose="020F0502020204030204" pitchFamily="34" charset="0"/>
               </a:rPr>
-              <a:t> </a:t>
-            </a:r>
-            <a:r>
-              <a:rPr lang="en-GB" sz="2200" b="1" u="sng" dirty="0">
-                <a:solidFill>
-                  <a:srgbClr val="000000"/>
-                </a:solidFill>
-                <a:effectLst/>
-                <a:latin typeface="Verdana" panose="020B0604030504040204" pitchFamily="34" charset="0"/>
-                <a:ea typeface="Times New Roman" panose="02020603050405020304" pitchFamily="18" charset="0"/>
-                <a:cs typeface="Times New Roman" panose="02020603050405020304" pitchFamily="18" charset="0"/>
-              </a:rPr>
-              <a:t>sensors &amp; ML to monitor and predict HABs and cyanotoxins.</a:t>
+              <a:t>					</a:t>
             </a:r>
             <a:br>
               <a:rPr lang="en-US" sz="1600" dirty="0">
@@ -7648,37 +7753,7 @@
                 <a:latin typeface="Calibri" panose="020F0502020204030204" pitchFamily="34" charset="0"/>
                 <a:ea typeface="Calibri" panose="020F0502020204030204" pitchFamily="34" charset="0"/>
               </a:rPr>
-              <a:t>					</a:t>
-            </a:r>
-            <a:br>
-              <a:rPr lang="en-US" sz="1600" dirty="0">
-                <a:effectLst/>
-                <a:latin typeface="Calibri" panose="020F0502020204030204" pitchFamily="34" charset="0"/>
-                <a:ea typeface="Calibri" panose="020F0502020204030204" pitchFamily="34" charset="0"/>
-              </a:rPr>
-            </a:br>
-            <a:r>
-              <a:rPr lang="en-US" sz="1600" dirty="0">
-                <a:effectLst/>
-                <a:latin typeface="Calibri" panose="020F0502020204030204" pitchFamily="34" charset="0"/>
-                <a:ea typeface="Calibri" panose="020F0502020204030204" pitchFamily="34" charset="0"/>
-              </a:rPr>
-              <a:t>					</a:t>
-            </a:r>
-            <a:br>
-              <a:rPr lang="en-US" sz="1600" dirty="0">
-                <a:effectLst/>
-                <a:latin typeface="Calibri" panose="020F0502020204030204" pitchFamily="34" charset="0"/>
-                <a:ea typeface="Calibri" panose="020F0502020204030204" pitchFamily="34" charset="0"/>
-              </a:rPr>
-            </a:br>
-            <a:r>
-              <a:rPr lang="en-US" sz="1600" dirty="0">
-                <a:effectLst/>
-                <a:latin typeface="Calibri" panose="020F0502020204030204" pitchFamily="34" charset="0"/>
-                <a:ea typeface="Calibri" panose="020F0502020204030204" pitchFamily="34" charset="0"/>
-              </a:rPr>
-              <a:t>				     </a:t>
+              <a:t>				    - </a:t>
             </a:r>
             <a:r>
               <a:rPr lang="en-GB" sz="1600" dirty="0">
@@ -8779,8 +8854,8 @@
               <a:buChar char="•"/>
             </a:pPr>
             <a:r>
-              <a:rPr lang="en-GB" sz="2200" b="0" dirty="0"/>
-              <a:t>Th</a:t>
+              <a:rPr lang="en-US" b="0" dirty="0"/>
+              <a:t>Harmful Algal Blooms-HABs are a phenomenon in which the water body e.g. lakes turns dark blue-green because of excessive algal growth, potentially harming humans and animal, e.g., Unsightly nuisance, acute liver damage when the contaminated water is ingested, irritation, whatnot.</a:t>
             </a:r>
           </a:p>
           <a:p>
@@ -8788,10 +8863,7 @@
               <a:buFont typeface="Arial" panose="020B0604020202020204" pitchFamily="34" charset="0"/>
               <a:buChar char="•"/>
             </a:pPr>
-            <a:r>
-              <a:rPr lang="en-GB" sz="2200" b="0" dirty="0"/>
-              <a:t>Support the Title</a:t>
-            </a:r>
+            <a:endParaRPr lang="en-US" b="0" dirty="0"/>
           </a:p>
           <a:p>
             <a:pPr marL="342900" lvl="0" indent="-342900">
@@ -9767,14 +9839,14 @@
           <p:nvPr>
             <p:extLst>
               <p:ext uri="{D42A27DB-BD31-4B8C-83A1-F6EECF244321}">
-                <p14:modId xmlns:p14="http://schemas.microsoft.com/office/powerpoint/2010/main" val="1430014975"/>
+                <p14:modId xmlns:p14="http://schemas.microsoft.com/office/powerpoint/2010/main" val="3671174665"/>
               </p:ext>
             </p:extLst>
           </p:nvPr>
         </p:nvGraphicFramePr>
         <p:xfrm>
           <a:off x="250825" y="1844824"/>
-          <a:ext cx="8640762" cy="2448270"/>
+          <a:ext cx="8640762" cy="2364504"/>
         </p:xfrm>
         <a:graphic>
           <a:graphicData uri="http://schemas.openxmlformats.org/drawingml/2006/table">
@@ -9790,14 +9862,14 @@
                     </a:ext>
                   </a:extLst>
                 </a:gridCol>
-                <a:gridCol w="4281458">
+                <a:gridCol w="4128564">
                   <a:extLst>
                     <a:ext uri="{9D8B030D-6E8A-4147-A177-3AD203B41FA5}">
                       <a16:colId xmlns:a16="http://schemas.microsoft.com/office/drawing/2014/main" val="504941183"/>
                     </a:ext>
                   </a:extLst>
                 </a:gridCol>
-                <a:gridCol w="1790429">
+                <a:gridCol w="1943323">
                   <a:extLst>
                     <a:ext uri="{9D8B030D-6E8A-4147-A177-3AD203B41FA5}">
                       <a16:colId xmlns:a16="http://schemas.microsoft.com/office/drawing/2014/main" val="2863412154"/>
@@ -10041,7 +10113,7 @@
                   </a:ext>
                 </a:extLst>
               </a:tr>
-              <a:tr h="723846">
+              <a:tr h="579832">
                 <a:tc>
                   <a:txBody>
                     <a:bodyPr/>
@@ -10129,12 +10201,16 @@
                     <a:p>
                       <a:r>
                         <a:rPr lang="en-US" sz="1400" dirty="0"/>
-                        <a:t>-Uncertain</a:t>
+                        <a:t>-</a:t>
+                      </a:r>
+                      <a:r>
+                        <a:rPr lang="en-US" sz="1550" dirty="0"/>
+                        <a:t>Uncertain</a:t>
                       </a:r>
                     </a:p>
                     <a:p>
                       <a:r>
-                        <a:rPr lang="en-US" sz="1400" dirty="0"/>
+                        <a:rPr lang="en-US" sz="1550" dirty="0"/>
                         <a:t>-Within my control</a:t>
                       </a:r>
                     </a:p>

</xml_diff>

<commit_message>
:fire:, :pencil:, :books: :camera: :hammer: Close Intro
</commit_message>
<xml_diff>
--- a/MY PRESENTATION.pptx
+++ b/MY PRESENTATION.pptx
@@ -5,24 +5,23 @@
     <p:sldMasterId id="2147483652" r:id="rId1"/>
   </p:sldMasterIdLst>
   <p:notesMasterIdLst>
-    <p:notesMasterId r:id="rId14"/>
+    <p:notesMasterId r:id="rId13"/>
   </p:notesMasterIdLst>
   <p:handoutMasterIdLst>
-    <p:handoutMasterId r:id="rId15"/>
+    <p:handoutMasterId r:id="rId14"/>
   </p:handoutMasterIdLst>
   <p:sldIdLst>
     <p:sldId id="325" r:id="rId2"/>
     <p:sldId id="330" r:id="rId3"/>
-    <p:sldId id="356" r:id="rId4"/>
-    <p:sldId id="331" r:id="rId5"/>
-    <p:sldId id="332" r:id="rId6"/>
-    <p:sldId id="333" r:id="rId7"/>
-    <p:sldId id="355" r:id="rId8"/>
-    <p:sldId id="354" r:id="rId9"/>
-    <p:sldId id="334" r:id="rId10"/>
-    <p:sldId id="335" r:id="rId11"/>
-    <p:sldId id="353" r:id="rId12"/>
-    <p:sldId id="324" r:id="rId13"/>
+    <p:sldId id="331" r:id="rId4"/>
+    <p:sldId id="332" r:id="rId5"/>
+    <p:sldId id="333" r:id="rId6"/>
+    <p:sldId id="355" r:id="rId7"/>
+    <p:sldId id="354" r:id="rId8"/>
+    <p:sldId id="334" r:id="rId9"/>
+    <p:sldId id="335" r:id="rId10"/>
+    <p:sldId id="353" r:id="rId11"/>
+    <p:sldId id="324" r:id="rId12"/>
   </p:sldIdLst>
   <p:sldSz cx="9144000" cy="6858000" type="screen4x3"/>
   <p:notesSz cx="6858000" cy="9947275"/>
@@ -2438,7 +2437,7 @@
               <a:pPr>
                 <a:defRPr/>
               </a:pPr>
-              <a:t>9</a:t>
+              <a:t>8</a:t>
             </a:fld>
             <a:endParaRPr lang="en-GB"/>
           </a:p>
@@ -8063,382 +8062,6 @@
       </p:grpSpPr>
       <p:sp>
         <p:nvSpPr>
-          <p:cNvPr id="2" name="Text Placeholder 1">
-            <a:extLst>
-              <a:ext uri="{FF2B5EF4-FFF2-40B4-BE49-F238E27FC236}">
-                <a16:creationId xmlns:a16="http://schemas.microsoft.com/office/drawing/2014/main" id="{327FB035-4EC4-45C3-8B2F-AED423F29F13}"/>
-              </a:ext>
-            </a:extLst>
-          </p:cNvPr>
-          <p:cNvSpPr>
-            <a:spLocks noGrp="1"/>
-          </p:cNvSpPr>
-          <p:nvPr>
-            <p:ph type="body" idx="1"/>
-          </p:nvPr>
-        </p:nvSpPr>
-        <p:spPr/>
-        <p:txBody>
-          <a:bodyPr/>
-          <a:lstStyle/>
-          <a:p>
-            <a:pPr marL="514350" marR="0" lvl="0" indent="-514350" fontAlgn="base">
-              <a:lnSpc>
-                <a:spcPct val="107000"/>
-              </a:lnSpc>
-              <a:spcBef>
-                <a:spcPts val="0"/>
-              </a:spcBef>
-              <a:spcAft>
-                <a:spcPts val="0"/>
-              </a:spcAft>
-              <a:buSzPts val="1000"/>
-              <a:buFont typeface="+mj-lt"/>
-              <a:buAutoNum type="romanUcPeriod"/>
-              <a:tabLst>
-                <a:tab pos="457200" algn="l"/>
-              </a:tabLst>
-            </a:pPr>
-            <a:r>
-              <a:rPr lang="en-GB" b="0" dirty="0">
-                <a:solidFill>
-                  <a:srgbClr val="000000"/>
-                </a:solidFill>
-                <a:effectLst/>
-                <a:cs typeface="Times New Roman" panose="02020603050405020304" pitchFamily="18" charset="0"/>
-              </a:rPr>
-              <a:t>Chlorophyl-a Geographical Maps associating the occurrence of the Harmful Algal Blooms and Cyanobacteria.</a:t>
-            </a:r>
-          </a:p>
-          <a:p>
-            <a:pPr marL="514350" marR="0" lvl="0" indent="-514350" fontAlgn="base">
-              <a:lnSpc>
-                <a:spcPct val="107000"/>
-              </a:lnSpc>
-              <a:spcBef>
-                <a:spcPts val="0"/>
-              </a:spcBef>
-              <a:spcAft>
-                <a:spcPts val="0"/>
-              </a:spcAft>
-              <a:buSzPts val="1000"/>
-              <a:buFont typeface="+mj-lt"/>
-              <a:buAutoNum type="romanUcPeriod"/>
-              <a:tabLst>
-                <a:tab pos="457200" algn="l"/>
-              </a:tabLst>
-            </a:pPr>
-            <a:endParaRPr lang="en-GB" b="0" dirty="0">
-              <a:solidFill>
-                <a:srgbClr val="000000"/>
-              </a:solidFill>
-              <a:effectLst/>
-              <a:cs typeface="Times New Roman" panose="02020603050405020304" pitchFamily="18" charset="0"/>
-            </a:endParaRPr>
-          </a:p>
-          <a:p>
-            <a:pPr marL="514350" marR="0" lvl="0" indent="-514350" fontAlgn="base">
-              <a:lnSpc>
-                <a:spcPct val="107000"/>
-              </a:lnSpc>
-              <a:spcBef>
-                <a:spcPts val="0"/>
-              </a:spcBef>
-              <a:spcAft>
-                <a:spcPts val="0"/>
-              </a:spcAft>
-              <a:buSzPts val="1000"/>
-              <a:buFont typeface="+mj-lt"/>
-              <a:buAutoNum type="romanUcPeriod"/>
-              <a:tabLst>
-                <a:tab pos="457200" algn="l"/>
-              </a:tabLst>
-            </a:pPr>
-            <a:r>
-              <a:rPr lang="en-GB" b="0" dirty="0">
-                <a:solidFill>
-                  <a:srgbClr val="000000"/>
-                </a:solidFill>
-                <a:effectLst/>
-                <a:cs typeface="Times New Roman" panose="02020603050405020304" pitchFamily="18" charset="0"/>
-              </a:rPr>
-              <a:t>Automated system that monitors and reports geo-tagged data</a:t>
-            </a:r>
-          </a:p>
-          <a:p>
-            <a:pPr marL="514350" marR="0" lvl="0" indent="-514350" fontAlgn="base">
-              <a:lnSpc>
-                <a:spcPct val="107000"/>
-              </a:lnSpc>
-              <a:spcBef>
-                <a:spcPts val="0"/>
-              </a:spcBef>
-              <a:spcAft>
-                <a:spcPts val="0"/>
-              </a:spcAft>
-              <a:buSzPts val="1000"/>
-              <a:buFont typeface="+mj-lt"/>
-              <a:buAutoNum type="romanUcPeriod"/>
-              <a:tabLst>
-                <a:tab pos="457200" algn="l"/>
-              </a:tabLst>
-            </a:pPr>
-            <a:endParaRPr lang="en-US" b="0" dirty="0">
-              <a:solidFill>
-                <a:srgbClr val="000000"/>
-              </a:solidFill>
-              <a:effectLst/>
-            </a:endParaRPr>
-          </a:p>
-          <a:p>
-            <a:pPr marL="514350" marR="0" lvl="0" indent="-514350" fontAlgn="base">
-              <a:lnSpc>
-                <a:spcPct val="107000"/>
-              </a:lnSpc>
-              <a:spcBef>
-                <a:spcPts val="0"/>
-              </a:spcBef>
-              <a:spcAft>
-                <a:spcPts val="0"/>
-              </a:spcAft>
-              <a:buSzPts val="1000"/>
-              <a:buFont typeface="+mj-lt"/>
-              <a:buAutoNum type="romanUcPeriod"/>
-              <a:tabLst>
-                <a:tab pos="457200" algn="l"/>
-              </a:tabLst>
-            </a:pPr>
-            <a:r>
-              <a:rPr lang="en-GB" b="0" dirty="0">
-                <a:solidFill>
-                  <a:srgbClr val="000000"/>
-                </a:solidFill>
-                <a:effectLst/>
-                <a:cs typeface="Times New Roman" panose="02020603050405020304" pitchFamily="18" charset="0"/>
-              </a:rPr>
-              <a:t>Reported confirmation alert Text SMS reporting in near-real time the </a:t>
-            </a:r>
-            <a:r>
-              <a:rPr lang="en-GB" b="0" i="1" dirty="0">
-                <a:solidFill>
-                  <a:srgbClr val="000000"/>
-                </a:solidFill>
-                <a:effectLst/>
-                <a:cs typeface="Times New Roman" panose="02020603050405020304" pitchFamily="18" charset="0"/>
-              </a:rPr>
-              <a:t>in-situ </a:t>
-            </a:r>
-            <a:r>
-              <a:rPr lang="en-GB" b="0" dirty="0">
-                <a:solidFill>
-                  <a:srgbClr val="000000"/>
-                </a:solidFill>
-                <a:effectLst/>
-                <a:cs typeface="Times New Roman" panose="02020603050405020304" pitchFamily="18" charset="0"/>
-              </a:rPr>
-              <a:t>status from the sensors.</a:t>
-            </a:r>
-          </a:p>
-          <a:p>
-            <a:pPr marL="514350" marR="0" lvl="0" indent="-514350" fontAlgn="base">
-              <a:lnSpc>
-                <a:spcPct val="107000"/>
-              </a:lnSpc>
-              <a:spcBef>
-                <a:spcPts val="0"/>
-              </a:spcBef>
-              <a:spcAft>
-                <a:spcPts val="0"/>
-              </a:spcAft>
-              <a:buSzPts val="1000"/>
-              <a:buFont typeface="+mj-lt"/>
-              <a:buAutoNum type="romanUcPeriod"/>
-              <a:tabLst>
-                <a:tab pos="457200" algn="l"/>
-              </a:tabLst>
-            </a:pPr>
-            <a:endParaRPr lang="en-GB" b="0" dirty="0">
-              <a:solidFill>
-                <a:srgbClr val="000000"/>
-              </a:solidFill>
-              <a:cs typeface="Times New Roman" panose="02020603050405020304" pitchFamily="18" charset="0"/>
-            </a:endParaRPr>
-          </a:p>
-          <a:p>
-            <a:pPr marL="514350" marR="0" lvl="0" indent="-514350" fontAlgn="base">
-              <a:lnSpc>
-                <a:spcPct val="107000"/>
-              </a:lnSpc>
-              <a:spcBef>
-                <a:spcPts val="0"/>
-              </a:spcBef>
-              <a:spcAft>
-                <a:spcPts val="0"/>
-              </a:spcAft>
-              <a:buSzPts val="1000"/>
-              <a:buFont typeface="+mj-lt"/>
-              <a:buAutoNum type="romanUcPeriod"/>
-              <a:tabLst>
-                <a:tab pos="457200" algn="l"/>
-              </a:tabLst>
-            </a:pPr>
-            <a:r>
-              <a:rPr lang="en-GB" b="0" dirty="0">
-                <a:solidFill>
-                  <a:srgbClr val="000000"/>
-                </a:solidFill>
-                <a:effectLst/>
-                <a:cs typeface="Times New Roman" panose="02020603050405020304" pitchFamily="18" charset="0"/>
-              </a:rPr>
-              <a:t>Time Series predictive model on any looming bloom.</a:t>
-            </a:r>
-          </a:p>
-          <a:p>
-            <a:pPr marL="514350" marR="0" lvl="0" indent="-514350" fontAlgn="base">
-              <a:lnSpc>
-                <a:spcPct val="107000"/>
-              </a:lnSpc>
-              <a:spcBef>
-                <a:spcPts val="0"/>
-              </a:spcBef>
-              <a:spcAft>
-                <a:spcPts val="0"/>
-              </a:spcAft>
-              <a:buSzPts val="1000"/>
-              <a:buFont typeface="+mj-lt"/>
-              <a:buAutoNum type="romanUcPeriod"/>
-              <a:tabLst>
-                <a:tab pos="457200" algn="l"/>
-              </a:tabLst>
-            </a:pPr>
-            <a:endParaRPr lang="en-US" b="0" dirty="0">
-              <a:solidFill>
-                <a:srgbClr val="000000"/>
-              </a:solidFill>
-              <a:effectLst/>
-            </a:endParaRPr>
-          </a:p>
-          <a:p>
-            <a:pPr marL="0" marR="0" lvl="0" indent="0" fontAlgn="base">
-              <a:lnSpc>
-                <a:spcPct val="107000"/>
-              </a:lnSpc>
-              <a:spcBef>
-                <a:spcPts val="0"/>
-              </a:spcBef>
-              <a:spcAft>
-                <a:spcPts val="0"/>
-              </a:spcAft>
-              <a:buSzPts val="1000"/>
-              <a:tabLst>
-                <a:tab pos="457200" algn="l"/>
-              </a:tabLst>
-            </a:pPr>
-            <a:endParaRPr lang="en-US" sz="1800" b="0" dirty="0">
-              <a:solidFill>
-                <a:srgbClr val="000000"/>
-              </a:solidFill>
-              <a:effectLst/>
-              <a:latin typeface="Calibri" panose="020F0502020204030204" pitchFamily="34" charset="0"/>
-              <a:ea typeface="Calibri" panose="020F0502020204030204" pitchFamily="34" charset="0"/>
-            </a:endParaRPr>
-          </a:p>
-        </p:txBody>
-      </p:sp>
-      <p:sp>
-        <p:nvSpPr>
-          <p:cNvPr id="3" name="Footer Placeholder 2">
-            <a:extLst>
-              <a:ext uri="{FF2B5EF4-FFF2-40B4-BE49-F238E27FC236}">
-                <a16:creationId xmlns:a16="http://schemas.microsoft.com/office/drawing/2014/main" id="{5D13DC20-297E-417D-8DFC-DC2FCABB764B}"/>
-              </a:ext>
-            </a:extLst>
-          </p:cNvPr>
-          <p:cNvSpPr>
-            <a:spLocks noGrp="1"/>
-          </p:cNvSpPr>
-          <p:nvPr>
-            <p:ph type="ftr" sz="quarter" idx="10"/>
-          </p:nvPr>
-        </p:nvSpPr>
-        <p:spPr/>
-        <p:txBody>
-          <a:bodyPr/>
-          <a:lstStyle/>
-          <a:p>
-            <a:pPr>
-              <a:defRPr/>
-            </a:pPr>
-            <a:endParaRPr lang="de-DE"/>
-          </a:p>
-          <a:p>
-            <a:pPr>
-              <a:defRPr/>
-            </a:pPr>
-            <a:endParaRPr lang="de-DE"/>
-          </a:p>
-        </p:txBody>
-      </p:sp>
-      <p:sp>
-        <p:nvSpPr>
-          <p:cNvPr id="4" name="Title 3">
-            <a:extLst>
-              <a:ext uri="{FF2B5EF4-FFF2-40B4-BE49-F238E27FC236}">
-                <a16:creationId xmlns:a16="http://schemas.microsoft.com/office/drawing/2014/main" id="{5EDBB8AF-905E-406C-B321-B53DDA2D2878}"/>
-              </a:ext>
-            </a:extLst>
-          </p:cNvPr>
-          <p:cNvSpPr>
-            <a:spLocks noGrp="1"/>
-          </p:cNvSpPr>
-          <p:nvPr>
-            <p:ph type="title"/>
-          </p:nvPr>
-        </p:nvSpPr>
-        <p:spPr/>
-        <p:txBody>
-          <a:bodyPr/>
-          <a:lstStyle/>
-          <a:p>
-            <a:r>
-              <a:rPr lang="en-US" dirty="0"/>
-              <a:t>Expected Results</a:t>
-            </a:r>
-          </a:p>
-        </p:txBody>
-      </p:sp>
-    </p:spTree>
-    <p:extLst>
-      <p:ext uri="{BB962C8B-B14F-4D97-AF65-F5344CB8AC3E}">
-        <p14:creationId xmlns:p14="http://schemas.microsoft.com/office/powerpoint/2010/main" val="136174935"/>
-      </p:ext>
-    </p:extLst>
-  </p:cSld>
-  <p:clrMapOvr>
-    <a:masterClrMapping/>
-  </p:clrMapOvr>
-</p:sld>
-</file>
-
-<file path=ppt/slides/slide11.xml><?xml version="1.0" encoding="utf-8"?>
-<p:sld xmlns:a="http://schemas.openxmlformats.org/drawingml/2006/main" xmlns:r="http://schemas.openxmlformats.org/officeDocument/2006/relationships" xmlns:p="http://schemas.openxmlformats.org/presentationml/2006/main">
-  <p:cSld>
-    <p:spTree>
-      <p:nvGrpSpPr>
-        <p:cNvPr id="1" name=""/>
-        <p:cNvGrpSpPr/>
-        <p:nvPr/>
-      </p:nvGrpSpPr>
-      <p:grpSpPr>
-        <a:xfrm>
-          <a:off x="0" y="0"/>
-          <a:ext cx="0" cy="0"/>
-          <a:chOff x="0" y="0"/>
-          <a:chExt cx="0" cy="0"/>
-        </a:xfrm>
-      </p:grpSpPr>
-      <p:sp>
-        <p:nvSpPr>
           <p:cNvPr id="3" name="Footer Placeholder 2"/>
           <p:cNvSpPr>
             <a:spLocks noGrp="1"/>
@@ -8536,7 +8159,7 @@
 </p:sld>
 </file>
 
-<file path=ppt/slides/slide12.xml><?xml version="1.0" encoding="utf-8"?>
+<file path=ppt/slides/slide11.xml><?xml version="1.0" encoding="utf-8"?>
 <p:sld xmlns:a="http://schemas.openxmlformats.org/drawingml/2006/main" xmlns:r="http://schemas.openxmlformats.org/officeDocument/2006/relationships" xmlns:p="http://schemas.openxmlformats.org/presentationml/2006/main">
   <p:cSld>
     <p:spTree>
@@ -8855,7 +8478,15 @@
             </a:pPr>
             <a:r>
               <a:rPr lang="en-US" b="0" dirty="0"/>
-              <a:t>Harmful Algal Blooms-HABs are a phenomenon in which the water body e.g. lakes turns dark blue-green because of excessive algal growth, potentially harming humans and animal, e.g., Unsightly nuisance, acute liver damage when the contaminated water is ingested, irritation, whatnot.</a:t>
+              <a:t>Toxic Cyanobacteria-rich Harmful Algal Blooms (CyanoHABs) , a phenomenon in which the water body e.g. lakes turns </a:t>
+            </a:r>
+            <a:r>
+              <a:rPr lang="en-US" dirty="0"/>
+              <a:t>dark blue-green </a:t>
+            </a:r>
+            <a:r>
+              <a:rPr lang="en-US" b="0" dirty="0"/>
+              <a:t>due to excessive algal growth; potentially harming humans and animal, e.g., Unsightly nuisance, acute liver damage when ingested, irritation, fish deaths, whatnot.</a:t>
             </a:r>
           </a:p>
           <a:p>
@@ -8871,31 +8502,39 @@
               <a:buChar char="•"/>
             </a:pPr>
             <a:r>
-              <a:rPr lang="en-GB" sz="2200" b="0" dirty="0"/>
-              <a:t>Why there’s need for this research</a:t>
-            </a:r>
-          </a:p>
-          <a:p>
-            <a:pPr marL="1071562" lvl="4" indent="-342900">
+              <a:rPr lang="en-US" b="0" dirty="0"/>
+              <a:t>Hence, quantifying the detailed spatial distributions of CyanoHABs in L. Victoria on a regular and frequent basis is of great significance, which requires high spatiotemporal resolution monitoring abilities- (</a:t>
+            </a:r>
+            <a:r>
+              <a:rPr lang="en-US" b="0" dirty="0" err="1"/>
+              <a:t>Sitoki</a:t>
+            </a:r>
+            <a:r>
+              <a:rPr lang="en-US" b="0" dirty="0"/>
+              <a:t> et al., 2012)</a:t>
+            </a:r>
+          </a:p>
+          <a:p>
+            <a:pPr marL="0" lvl="0" indent="0"/>
+            <a:endParaRPr lang="en-US" b="0" dirty="0"/>
+          </a:p>
+          <a:p>
+            <a:pPr marL="342900" indent="-342900">
               <a:buFont typeface="Arial" panose="020B0604020202020204" pitchFamily="34" charset="0"/>
               <a:buChar char="•"/>
             </a:pPr>
             <a:r>
-              <a:rPr lang="en-GB" sz="2100" b="0" dirty="0"/>
-              <a:t>What have other researchers said about this issue? </a:t>
-            </a:r>
-          </a:p>
-          <a:p>
-            <a:pPr marL="1071562" lvl="4" indent="-342900">
-              <a:buFont typeface="Arial" panose="020B0604020202020204" pitchFamily="34" charset="0"/>
-              <a:buChar char="•"/>
-            </a:pPr>
-            <a:r>
-              <a:rPr lang="en-GB" sz="2100" b="0" dirty="0"/>
-              <a:t>What has been done to solve this problem?</a:t>
-            </a:r>
-          </a:p>
-          <a:p>
+              <a:rPr lang="en-US" b="0" dirty="0"/>
+              <a:t>There however exists that niche to support the near-real time space observations</a:t>
+            </a:r>
+            <a:r>
+              <a:rPr lang="en-GB" b="0" dirty="0"/>
+              <a:t> with a geointelligent </a:t>
+            </a:r>
+            <a:r>
+              <a:rPr lang="en-US" b="0" dirty="0"/>
+              <a:t>reporting system and further predict any looming bloom.</a:t>
+            </a:r>
             <a:endParaRPr lang="en-US" dirty="0"/>
           </a:p>
         </p:txBody>
@@ -8997,183 +8636,6 @@
           <p:cNvPr id="2" name="Text Placeholder 1">
             <a:extLst>
               <a:ext uri="{FF2B5EF4-FFF2-40B4-BE49-F238E27FC236}">
-                <a16:creationId xmlns:a16="http://schemas.microsoft.com/office/drawing/2014/main" id="{C68A5470-9702-47CF-8379-7842B2A3E04E}"/>
-              </a:ext>
-            </a:extLst>
-          </p:cNvPr>
-          <p:cNvSpPr>
-            <a:spLocks noGrp="1"/>
-          </p:cNvSpPr>
-          <p:nvPr>
-            <p:ph type="body" idx="1"/>
-          </p:nvPr>
-        </p:nvSpPr>
-        <p:spPr/>
-        <p:txBody>
-          <a:bodyPr/>
-          <a:lstStyle/>
-          <a:p>
-            <a:pPr marL="342900" lvl="0" indent="-342900">
-              <a:buFont typeface="Arial" panose="020B0604020202020204" pitchFamily="34" charset="0"/>
-              <a:buChar char="•"/>
-            </a:pPr>
-            <a:r>
-              <a:rPr lang="en-GB" sz="2200" b="0" dirty="0"/>
-              <a:t>Move 1 establish your territory (say what the topic is about)</a:t>
-            </a:r>
-          </a:p>
-          <a:p>
-            <a:pPr marL="342900" lvl="0" indent="-342900">
-              <a:buFont typeface="Arial" panose="020B0604020202020204" pitchFamily="34" charset="0"/>
-              <a:buChar char="•"/>
-            </a:pPr>
-            <a:r>
-              <a:rPr lang="en-GB" sz="2200" b="0" dirty="0"/>
-              <a:t>Move 2 establish a niche (show why there needs to be further research on your topic)</a:t>
-            </a:r>
-          </a:p>
-          <a:p>
-            <a:pPr marL="342900" lvl="0" indent="-342900">
-              <a:buFont typeface="Arial" panose="020B0604020202020204" pitchFamily="34" charset="0"/>
-              <a:buChar char="•"/>
-            </a:pPr>
-            <a:r>
-              <a:rPr lang="en-GB" sz="2200" b="0" dirty="0"/>
-              <a:t>Move 3 introduce the current research (make hypotheses; state the research questions)</a:t>
-            </a:r>
-          </a:p>
-          <a:p>
-            <a:pPr marL="342900" lvl="0" indent="-342900">
-              <a:buFont typeface="Arial" panose="020B0604020202020204" pitchFamily="34" charset="0"/>
-              <a:buChar char="•"/>
-            </a:pPr>
-            <a:r>
-              <a:rPr lang="en-GB" sz="2200" b="0" dirty="0"/>
-              <a:t>Start globally &gt; regionally &gt; nationally &gt; locally outline the issue at hand. </a:t>
-            </a:r>
-          </a:p>
-          <a:p>
-            <a:pPr marL="1071562" lvl="4" indent="-342900">
-              <a:buFont typeface="Arial" panose="020B0604020202020204" pitchFamily="34" charset="0"/>
-              <a:buChar char="•"/>
-            </a:pPr>
-            <a:r>
-              <a:rPr lang="en-GB" sz="2100" b="0" dirty="0"/>
-              <a:t>What have other researchers said about this issue? </a:t>
-            </a:r>
-          </a:p>
-          <a:p>
-            <a:pPr marL="1071562" lvl="4" indent="-342900">
-              <a:buFont typeface="Arial" panose="020B0604020202020204" pitchFamily="34" charset="0"/>
-              <a:buChar char="•"/>
-            </a:pPr>
-            <a:r>
-              <a:rPr lang="en-GB" sz="2100" b="0" dirty="0"/>
-              <a:t>What has been done to solve this problem?</a:t>
-            </a:r>
-          </a:p>
-          <a:p>
-            <a:endParaRPr lang="en-US" dirty="0"/>
-          </a:p>
-        </p:txBody>
-      </p:sp>
-      <p:sp>
-        <p:nvSpPr>
-          <p:cNvPr id="3" name="Footer Placeholder 2">
-            <a:extLst>
-              <a:ext uri="{FF2B5EF4-FFF2-40B4-BE49-F238E27FC236}">
-                <a16:creationId xmlns:a16="http://schemas.microsoft.com/office/drawing/2014/main" id="{6C4530F9-0889-4279-9303-C5AA3812069D}"/>
-              </a:ext>
-            </a:extLst>
-          </p:cNvPr>
-          <p:cNvSpPr>
-            <a:spLocks noGrp="1"/>
-          </p:cNvSpPr>
-          <p:nvPr>
-            <p:ph type="ftr" sz="quarter" idx="10"/>
-          </p:nvPr>
-        </p:nvSpPr>
-        <p:spPr/>
-        <p:txBody>
-          <a:bodyPr/>
-          <a:lstStyle/>
-          <a:p>
-            <a:pPr>
-              <a:defRPr/>
-            </a:pPr>
-            <a:endParaRPr lang="de-DE"/>
-          </a:p>
-          <a:p>
-            <a:pPr>
-              <a:defRPr/>
-            </a:pPr>
-            <a:endParaRPr lang="de-DE"/>
-          </a:p>
-        </p:txBody>
-      </p:sp>
-      <p:sp>
-        <p:nvSpPr>
-          <p:cNvPr id="4" name="Title 3">
-            <a:extLst>
-              <a:ext uri="{FF2B5EF4-FFF2-40B4-BE49-F238E27FC236}">
-                <a16:creationId xmlns:a16="http://schemas.microsoft.com/office/drawing/2014/main" id="{D19FEA75-F09B-476A-9D35-E7CFB503C85B}"/>
-              </a:ext>
-            </a:extLst>
-          </p:cNvPr>
-          <p:cNvSpPr>
-            <a:spLocks noGrp="1"/>
-          </p:cNvSpPr>
-          <p:nvPr>
-            <p:ph type="title"/>
-          </p:nvPr>
-        </p:nvSpPr>
-        <p:spPr/>
-        <p:txBody>
-          <a:bodyPr/>
-          <a:lstStyle/>
-          <a:p>
-            <a:r>
-              <a:rPr lang="en-US" dirty="0"/>
-              <a:t>Introduction </a:t>
-            </a:r>
-          </a:p>
-        </p:txBody>
-      </p:sp>
-    </p:spTree>
-    <p:extLst>
-      <p:ext uri="{BB962C8B-B14F-4D97-AF65-F5344CB8AC3E}">
-        <p14:creationId xmlns:p14="http://schemas.microsoft.com/office/powerpoint/2010/main" val="3005417860"/>
-      </p:ext>
-    </p:extLst>
-  </p:cSld>
-  <p:clrMapOvr>
-    <a:masterClrMapping/>
-  </p:clrMapOvr>
-</p:sld>
-</file>
-
-<file path=ppt/slides/slide4.xml><?xml version="1.0" encoding="utf-8"?>
-<p:sld xmlns:a="http://schemas.openxmlformats.org/drawingml/2006/main" xmlns:r="http://schemas.openxmlformats.org/officeDocument/2006/relationships" xmlns:p="http://schemas.openxmlformats.org/presentationml/2006/main">
-  <p:cSld>
-    <p:spTree>
-      <p:nvGrpSpPr>
-        <p:cNvPr id="1" name=""/>
-        <p:cNvGrpSpPr/>
-        <p:nvPr/>
-      </p:nvGrpSpPr>
-      <p:grpSpPr>
-        <a:xfrm>
-          <a:off x="0" y="0"/>
-          <a:ext cx="0" cy="0"/>
-          <a:chOff x="0" y="0"/>
-          <a:chExt cx="0" cy="0"/>
-        </a:xfrm>
-      </p:grpSpPr>
-      <p:sp>
-        <p:nvSpPr>
-          <p:cNvPr id="2" name="Text Placeholder 1">
-            <a:extLst>
-              <a:ext uri="{FF2B5EF4-FFF2-40B4-BE49-F238E27FC236}">
                 <a16:creationId xmlns:a16="http://schemas.microsoft.com/office/drawing/2014/main" id="{C6BC2DDB-B407-4770-B67A-A85A9B1A8568}"/>
               </a:ext>
             </a:extLst>
@@ -9301,7 +8763,7 @@
 </p:sld>
 </file>
 
-<file path=ppt/slides/slide5.xml><?xml version="1.0" encoding="utf-8"?>
+<file path=ppt/slides/slide4.xml><?xml version="1.0" encoding="utf-8"?>
 <p:sld xmlns:a="http://schemas.openxmlformats.org/drawingml/2006/main" xmlns:r="http://schemas.openxmlformats.org/officeDocument/2006/relationships" xmlns:p="http://schemas.openxmlformats.org/presentationml/2006/main">
   <p:cSld>
     <p:spTree>
@@ -9501,7 +8963,7 @@
 </p:sld>
 </file>
 
-<file path=ppt/slides/slide6.xml><?xml version="1.0" encoding="utf-8"?>
+<file path=ppt/slides/slide5.xml><?xml version="1.0" encoding="utf-8"?>
 <p:sld xmlns:a="http://schemas.openxmlformats.org/drawingml/2006/main" xmlns:r="http://schemas.openxmlformats.org/officeDocument/2006/relationships" xmlns:p="http://schemas.openxmlformats.org/presentationml/2006/main">
   <p:cSld>
     <p:spTree>
@@ -9696,7 +9158,7 @@
 </p:sld>
 </file>
 
-<file path=ppt/slides/slide7.xml><?xml version="1.0" encoding="utf-8"?>
+<file path=ppt/slides/slide6.xml><?xml version="1.0" encoding="utf-8"?>
 <p:sld xmlns:a="http://schemas.openxmlformats.org/drawingml/2006/main" xmlns:r="http://schemas.openxmlformats.org/officeDocument/2006/relationships" xmlns:p="http://schemas.openxmlformats.org/presentationml/2006/main">
   <p:cSld>
     <p:spTree>
@@ -10518,7 +9980,7 @@
 </p:sld>
 </file>
 
-<file path=ppt/slides/slide8.xml><?xml version="1.0" encoding="utf-8"?>
+<file path=ppt/slides/slide7.xml><?xml version="1.0" encoding="utf-8"?>
 <p:sld xmlns:a="http://schemas.openxmlformats.org/drawingml/2006/main" xmlns:r="http://schemas.openxmlformats.org/officeDocument/2006/relationships" xmlns:p="http://schemas.openxmlformats.org/presentationml/2006/main">
   <p:cSld>
     <p:spTree>
@@ -10650,7 +10112,7 @@
 </p:sld>
 </file>
 
-<file path=ppt/slides/slide9.xml><?xml version="1.0" encoding="utf-8"?>
+<file path=ppt/slides/slide8.xml><?xml version="1.0" encoding="utf-8"?>
 <p:sld xmlns:a="http://schemas.openxmlformats.org/drawingml/2006/main" xmlns:r="http://schemas.openxmlformats.org/officeDocument/2006/relationships" xmlns:p="http://schemas.openxmlformats.org/presentationml/2006/main">
   <p:cSld>
     <p:spTree>
@@ -10859,6 +10321,382 @@
     <p:extLst>
       <p:ext uri="{BB962C8B-B14F-4D97-AF65-F5344CB8AC3E}">
         <p14:creationId xmlns:p14="http://schemas.microsoft.com/office/powerpoint/2010/main" val="827824677"/>
+      </p:ext>
+    </p:extLst>
+  </p:cSld>
+  <p:clrMapOvr>
+    <a:masterClrMapping/>
+  </p:clrMapOvr>
+</p:sld>
+</file>
+
+<file path=ppt/slides/slide9.xml><?xml version="1.0" encoding="utf-8"?>
+<p:sld xmlns:a="http://schemas.openxmlformats.org/drawingml/2006/main" xmlns:r="http://schemas.openxmlformats.org/officeDocument/2006/relationships" xmlns:p="http://schemas.openxmlformats.org/presentationml/2006/main">
+  <p:cSld>
+    <p:spTree>
+      <p:nvGrpSpPr>
+        <p:cNvPr id="1" name=""/>
+        <p:cNvGrpSpPr/>
+        <p:nvPr/>
+      </p:nvGrpSpPr>
+      <p:grpSpPr>
+        <a:xfrm>
+          <a:off x="0" y="0"/>
+          <a:ext cx="0" cy="0"/>
+          <a:chOff x="0" y="0"/>
+          <a:chExt cx="0" cy="0"/>
+        </a:xfrm>
+      </p:grpSpPr>
+      <p:sp>
+        <p:nvSpPr>
+          <p:cNvPr id="2" name="Text Placeholder 1">
+            <a:extLst>
+              <a:ext uri="{FF2B5EF4-FFF2-40B4-BE49-F238E27FC236}">
+                <a16:creationId xmlns:a16="http://schemas.microsoft.com/office/drawing/2014/main" id="{327FB035-4EC4-45C3-8B2F-AED423F29F13}"/>
+              </a:ext>
+            </a:extLst>
+          </p:cNvPr>
+          <p:cNvSpPr>
+            <a:spLocks noGrp="1"/>
+          </p:cNvSpPr>
+          <p:nvPr>
+            <p:ph type="body" idx="1"/>
+          </p:nvPr>
+        </p:nvSpPr>
+        <p:spPr/>
+        <p:txBody>
+          <a:bodyPr/>
+          <a:lstStyle/>
+          <a:p>
+            <a:pPr marL="514350" marR="0" lvl="0" indent="-514350" fontAlgn="base">
+              <a:lnSpc>
+                <a:spcPct val="107000"/>
+              </a:lnSpc>
+              <a:spcBef>
+                <a:spcPts val="0"/>
+              </a:spcBef>
+              <a:spcAft>
+                <a:spcPts val="0"/>
+              </a:spcAft>
+              <a:buSzPts val="1000"/>
+              <a:buFont typeface="+mj-lt"/>
+              <a:buAutoNum type="romanUcPeriod"/>
+              <a:tabLst>
+                <a:tab pos="457200" algn="l"/>
+              </a:tabLst>
+            </a:pPr>
+            <a:r>
+              <a:rPr lang="en-GB" b="0" dirty="0">
+                <a:solidFill>
+                  <a:srgbClr val="000000"/>
+                </a:solidFill>
+                <a:effectLst/>
+                <a:cs typeface="Times New Roman" panose="02020603050405020304" pitchFamily="18" charset="0"/>
+              </a:rPr>
+              <a:t>Chlorophyl-a Geographical Maps associating the occurrence of the Harmful Algal Blooms and Cyanobacteria.</a:t>
+            </a:r>
+          </a:p>
+          <a:p>
+            <a:pPr marL="514350" marR="0" lvl="0" indent="-514350" fontAlgn="base">
+              <a:lnSpc>
+                <a:spcPct val="107000"/>
+              </a:lnSpc>
+              <a:spcBef>
+                <a:spcPts val="0"/>
+              </a:spcBef>
+              <a:spcAft>
+                <a:spcPts val="0"/>
+              </a:spcAft>
+              <a:buSzPts val="1000"/>
+              <a:buFont typeface="+mj-lt"/>
+              <a:buAutoNum type="romanUcPeriod"/>
+              <a:tabLst>
+                <a:tab pos="457200" algn="l"/>
+              </a:tabLst>
+            </a:pPr>
+            <a:endParaRPr lang="en-GB" b="0" dirty="0">
+              <a:solidFill>
+                <a:srgbClr val="000000"/>
+              </a:solidFill>
+              <a:effectLst/>
+              <a:cs typeface="Times New Roman" panose="02020603050405020304" pitchFamily="18" charset="0"/>
+            </a:endParaRPr>
+          </a:p>
+          <a:p>
+            <a:pPr marL="514350" marR="0" lvl="0" indent="-514350" fontAlgn="base">
+              <a:lnSpc>
+                <a:spcPct val="107000"/>
+              </a:lnSpc>
+              <a:spcBef>
+                <a:spcPts val="0"/>
+              </a:spcBef>
+              <a:spcAft>
+                <a:spcPts val="0"/>
+              </a:spcAft>
+              <a:buSzPts val="1000"/>
+              <a:buFont typeface="+mj-lt"/>
+              <a:buAutoNum type="romanUcPeriod"/>
+              <a:tabLst>
+                <a:tab pos="457200" algn="l"/>
+              </a:tabLst>
+            </a:pPr>
+            <a:r>
+              <a:rPr lang="en-GB" b="0" dirty="0">
+                <a:solidFill>
+                  <a:srgbClr val="000000"/>
+                </a:solidFill>
+                <a:effectLst/>
+                <a:cs typeface="Times New Roman" panose="02020603050405020304" pitchFamily="18" charset="0"/>
+              </a:rPr>
+              <a:t>Automated system that monitors and reports geo-tagged data</a:t>
+            </a:r>
+          </a:p>
+          <a:p>
+            <a:pPr marL="514350" marR="0" lvl="0" indent="-514350" fontAlgn="base">
+              <a:lnSpc>
+                <a:spcPct val="107000"/>
+              </a:lnSpc>
+              <a:spcBef>
+                <a:spcPts val="0"/>
+              </a:spcBef>
+              <a:spcAft>
+                <a:spcPts val="0"/>
+              </a:spcAft>
+              <a:buSzPts val="1000"/>
+              <a:buFont typeface="+mj-lt"/>
+              <a:buAutoNum type="romanUcPeriod"/>
+              <a:tabLst>
+                <a:tab pos="457200" algn="l"/>
+              </a:tabLst>
+            </a:pPr>
+            <a:endParaRPr lang="en-US" b="0" dirty="0">
+              <a:solidFill>
+                <a:srgbClr val="000000"/>
+              </a:solidFill>
+              <a:effectLst/>
+            </a:endParaRPr>
+          </a:p>
+          <a:p>
+            <a:pPr marL="514350" marR="0" lvl="0" indent="-514350" fontAlgn="base">
+              <a:lnSpc>
+                <a:spcPct val="107000"/>
+              </a:lnSpc>
+              <a:spcBef>
+                <a:spcPts val="0"/>
+              </a:spcBef>
+              <a:spcAft>
+                <a:spcPts val="0"/>
+              </a:spcAft>
+              <a:buSzPts val="1000"/>
+              <a:buFont typeface="+mj-lt"/>
+              <a:buAutoNum type="romanUcPeriod"/>
+              <a:tabLst>
+                <a:tab pos="457200" algn="l"/>
+              </a:tabLst>
+            </a:pPr>
+            <a:r>
+              <a:rPr lang="en-GB" b="0" dirty="0">
+                <a:solidFill>
+                  <a:srgbClr val="000000"/>
+                </a:solidFill>
+                <a:effectLst/>
+                <a:cs typeface="Times New Roman" panose="02020603050405020304" pitchFamily="18" charset="0"/>
+              </a:rPr>
+              <a:t>Reported confirmation alert Text SMS reporting in near-real time the </a:t>
+            </a:r>
+            <a:r>
+              <a:rPr lang="en-GB" b="0" i="1" dirty="0">
+                <a:solidFill>
+                  <a:srgbClr val="000000"/>
+                </a:solidFill>
+                <a:effectLst/>
+                <a:cs typeface="Times New Roman" panose="02020603050405020304" pitchFamily="18" charset="0"/>
+              </a:rPr>
+              <a:t>in-situ </a:t>
+            </a:r>
+            <a:r>
+              <a:rPr lang="en-GB" b="0" dirty="0">
+                <a:solidFill>
+                  <a:srgbClr val="000000"/>
+                </a:solidFill>
+                <a:effectLst/>
+                <a:cs typeface="Times New Roman" panose="02020603050405020304" pitchFamily="18" charset="0"/>
+              </a:rPr>
+              <a:t>status from the sensors.</a:t>
+            </a:r>
+          </a:p>
+          <a:p>
+            <a:pPr marL="514350" marR="0" lvl="0" indent="-514350" fontAlgn="base">
+              <a:lnSpc>
+                <a:spcPct val="107000"/>
+              </a:lnSpc>
+              <a:spcBef>
+                <a:spcPts val="0"/>
+              </a:spcBef>
+              <a:spcAft>
+                <a:spcPts val="0"/>
+              </a:spcAft>
+              <a:buSzPts val="1000"/>
+              <a:buFont typeface="+mj-lt"/>
+              <a:buAutoNum type="romanUcPeriod"/>
+              <a:tabLst>
+                <a:tab pos="457200" algn="l"/>
+              </a:tabLst>
+            </a:pPr>
+            <a:endParaRPr lang="en-GB" b="0" dirty="0">
+              <a:solidFill>
+                <a:srgbClr val="000000"/>
+              </a:solidFill>
+              <a:cs typeface="Times New Roman" panose="02020603050405020304" pitchFamily="18" charset="0"/>
+            </a:endParaRPr>
+          </a:p>
+          <a:p>
+            <a:pPr marL="514350" marR="0" lvl="0" indent="-514350" fontAlgn="base">
+              <a:lnSpc>
+                <a:spcPct val="107000"/>
+              </a:lnSpc>
+              <a:spcBef>
+                <a:spcPts val="0"/>
+              </a:spcBef>
+              <a:spcAft>
+                <a:spcPts val="0"/>
+              </a:spcAft>
+              <a:buSzPts val="1000"/>
+              <a:buFont typeface="+mj-lt"/>
+              <a:buAutoNum type="romanUcPeriod"/>
+              <a:tabLst>
+                <a:tab pos="457200" algn="l"/>
+              </a:tabLst>
+            </a:pPr>
+            <a:r>
+              <a:rPr lang="en-GB" b="0" dirty="0">
+                <a:solidFill>
+                  <a:srgbClr val="000000"/>
+                </a:solidFill>
+                <a:effectLst/>
+                <a:cs typeface="Times New Roman" panose="02020603050405020304" pitchFamily="18" charset="0"/>
+              </a:rPr>
+              <a:t>Time Series predictive model on any looming bloom.</a:t>
+            </a:r>
+          </a:p>
+          <a:p>
+            <a:pPr marL="514350" marR="0" lvl="0" indent="-514350" fontAlgn="base">
+              <a:lnSpc>
+                <a:spcPct val="107000"/>
+              </a:lnSpc>
+              <a:spcBef>
+                <a:spcPts val="0"/>
+              </a:spcBef>
+              <a:spcAft>
+                <a:spcPts val="0"/>
+              </a:spcAft>
+              <a:buSzPts val="1000"/>
+              <a:buFont typeface="+mj-lt"/>
+              <a:buAutoNum type="romanUcPeriod"/>
+              <a:tabLst>
+                <a:tab pos="457200" algn="l"/>
+              </a:tabLst>
+            </a:pPr>
+            <a:endParaRPr lang="en-US" b="0" dirty="0">
+              <a:solidFill>
+                <a:srgbClr val="000000"/>
+              </a:solidFill>
+              <a:effectLst/>
+            </a:endParaRPr>
+          </a:p>
+          <a:p>
+            <a:pPr marL="0" marR="0" lvl="0" indent="0" fontAlgn="base">
+              <a:lnSpc>
+                <a:spcPct val="107000"/>
+              </a:lnSpc>
+              <a:spcBef>
+                <a:spcPts val="0"/>
+              </a:spcBef>
+              <a:spcAft>
+                <a:spcPts val="0"/>
+              </a:spcAft>
+              <a:buSzPts val="1000"/>
+              <a:tabLst>
+                <a:tab pos="457200" algn="l"/>
+              </a:tabLst>
+            </a:pPr>
+            <a:endParaRPr lang="en-US" sz="1800" b="0" dirty="0">
+              <a:solidFill>
+                <a:srgbClr val="000000"/>
+              </a:solidFill>
+              <a:effectLst/>
+              <a:latin typeface="Calibri" panose="020F0502020204030204" pitchFamily="34" charset="0"/>
+              <a:ea typeface="Calibri" panose="020F0502020204030204" pitchFamily="34" charset="0"/>
+            </a:endParaRPr>
+          </a:p>
+        </p:txBody>
+      </p:sp>
+      <p:sp>
+        <p:nvSpPr>
+          <p:cNvPr id="3" name="Footer Placeholder 2">
+            <a:extLst>
+              <a:ext uri="{FF2B5EF4-FFF2-40B4-BE49-F238E27FC236}">
+                <a16:creationId xmlns:a16="http://schemas.microsoft.com/office/drawing/2014/main" id="{5D13DC20-297E-417D-8DFC-DC2FCABB764B}"/>
+              </a:ext>
+            </a:extLst>
+          </p:cNvPr>
+          <p:cNvSpPr>
+            <a:spLocks noGrp="1"/>
+          </p:cNvSpPr>
+          <p:nvPr>
+            <p:ph type="ftr" sz="quarter" idx="10"/>
+          </p:nvPr>
+        </p:nvSpPr>
+        <p:spPr/>
+        <p:txBody>
+          <a:bodyPr/>
+          <a:lstStyle/>
+          <a:p>
+            <a:pPr>
+              <a:defRPr/>
+            </a:pPr>
+            <a:endParaRPr lang="de-DE"/>
+          </a:p>
+          <a:p>
+            <a:pPr>
+              <a:defRPr/>
+            </a:pPr>
+            <a:endParaRPr lang="de-DE"/>
+          </a:p>
+        </p:txBody>
+      </p:sp>
+      <p:sp>
+        <p:nvSpPr>
+          <p:cNvPr id="4" name="Title 3">
+            <a:extLst>
+              <a:ext uri="{FF2B5EF4-FFF2-40B4-BE49-F238E27FC236}">
+                <a16:creationId xmlns:a16="http://schemas.microsoft.com/office/drawing/2014/main" id="{5EDBB8AF-905E-406C-B321-B53DDA2D2878}"/>
+              </a:ext>
+            </a:extLst>
+          </p:cNvPr>
+          <p:cNvSpPr>
+            <a:spLocks noGrp="1"/>
+          </p:cNvSpPr>
+          <p:nvPr>
+            <p:ph type="title"/>
+          </p:nvPr>
+        </p:nvSpPr>
+        <p:spPr/>
+        <p:txBody>
+          <a:bodyPr/>
+          <a:lstStyle/>
+          <a:p>
+            <a:r>
+              <a:rPr lang="en-US" dirty="0"/>
+              <a:t>Expected Results</a:t>
+            </a:r>
+          </a:p>
+        </p:txBody>
+      </p:sp>
+    </p:spTree>
+    <p:extLst>
+      <p:ext uri="{BB962C8B-B14F-4D97-AF65-F5344CB8AC3E}">
+        <p14:creationId xmlns:p14="http://schemas.microsoft.com/office/powerpoint/2010/main" val="136174935"/>
       </p:ext>
     </p:extLst>
   </p:cSld>

</xml_diff>

<commit_message>
:fire:, :pencil:, :books: :camera: :hammer: Start Prblm Statemnt
</commit_message>
<xml_diff>
--- a/MY PRESENTATION.pptx
+++ b/MY PRESENTATION.pptx
@@ -8490,10 +8490,21 @@
             </a:r>
           </a:p>
           <a:p>
-            <a:pPr marL="342900" lvl="0" indent="-342900">
-              <a:buFont typeface="Arial" panose="020B0604020202020204" pitchFamily="34" charset="0"/>
-              <a:buChar char="•"/>
+            <a:pPr marL="2557462" lvl="8" indent="0">
+              <a:buNone/>
             </a:pPr>
+            <a:r>
+              <a:rPr lang="en-US" b="0" dirty="0"/>
+              <a:t>						- </a:t>
+            </a:r>
+            <a:r>
+              <a:rPr lang="da-DK" b="0" dirty="0"/>
+              <a:t> </a:t>
+            </a:r>
+            <a:r>
+              <a:rPr lang="da-DK" dirty="0"/>
+              <a:t>WHO</a:t>
+            </a:r>
             <a:endParaRPr lang="en-US" b="0" dirty="0"/>
           </a:p>
           <a:p>
@@ -8657,20 +8668,108 @@
               <a:buChar char="•"/>
             </a:pPr>
             <a:r>
-              <a:rPr lang="en-US" sz="2200" b="0" dirty="0"/>
-              <a:t>Previous studies on the same problem by </a:t>
-            </a:r>
+              <a:rPr lang="en-US" b="0" dirty="0">
+                <a:solidFill>
+                  <a:srgbClr val="000000"/>
+                </a:solidFill>
+                <a:effectLst/>
+                <a:latin typeface="Verdana" panose="020B0604030504040204" pitchFamily="34" charset="0"/>
+                <a:ea typeface="Calibri" panose="020F0502020204030204" pitchFamily="34" charset="0"/>
+                <a:cs typeface="Arial" panose="020B0604020202020204" pitchFamily="34" charset="0"/>
+              </a:rPr>
+              <a:t>The rapidly escalating demographics along L. Victoria riparian reserves has negatively impacted water quality through deposits of agricultural, industrial runoff and sewer refuse </a:t>
+            </a:r>
+            <a:r>
+              <a:rPr lang="en-US" b="0" dirty="0">
+                <a:solidFill>
+                  <a:srgbClr val="000000"/>
+                </a:solidFill>
+                <a:ea typeface="Calibri" panose="020F0502020204030204" pitchFamily="34" charset="0"/>
+                <a:cs typeface="Arial" panose="020B0604020202020204" pitchFamily="34" charset="0"/>
+              </a:rPr>
+              <a:t>e</a:t>
+            </a:r>
+            <a:r>
+              <a:rPr lang="en-US" b="0" dirty="0">
+                <a:solidFill>
+                  <a:srgbClr val="000000"/>
+                </a:solidFill>
+                <a:effectLst/>
+                <a:latin typeface="Verdana" panose="020B0604030504040204" pitchFamily="34" charset="0"/>
+                <a:ea typeface="Calibri" panose="020F0502020204030204" pitchFamily="34" charset="0"/>
+                <a:cs typeface="Arial" panose="020B0604020202020204" pitchFamily="34" charset="0"/>
+              </a:rPr>
+              <a:t>utrophicating</a:t>
+            </a:r>
+            <a:r>
+              <a:rPr lang="en-US" b="0" dirty="0">
+                <a:solidFill>
+                  <a:srgbClr val="000000"/>
+                </a:solidFill>
+                <a:ea typeface="Calibri" panose="020F0502020204030204" pitchFamily="34" charset="0"/>
+                <a:cs typeface="Arial" panose="020B0604020202020204" pitchFamily="34" charset="0"/>
+              </a:rPr>
+              <a:t> the said region. (</a:t>
+            </a:r>
+            <a:r>
+              <a:rPr lang="en-US" sz="1800" b="0" dirty="0">
+                <a:solidFill>
+                  <a:srgbClr val="000000"/>
+                </a:solidFill>
+                <a:effectLst/>
+                <a:latin typeface="Verdana" panose="020B0604030504040204" pitchFamily="34" charset="0"/>
+                <a:ea typeface="Calibri" panose="020F0502020204030204" pitchFamily="34" charset="0"/>
+                <a:cs typeface="Arial" panose="020B0604020202020204" pitchFamily="34" charset="0"/>
+              </a:rPr>
+              <a:t>Burkholder et al., 2006; MOH)</a:t>
+            </a:r>
+            <a:r>
+              <a:rPr lang="en-US" b="0" dirty="0">
+                <a:solidFill>
+                  <a:srgbClr val="000000"/>
+                </a:solidFill>
+                <a:effectLst/>
+                <a:latin typeface="Verdana" panose="020B0604030504040204" pitchFamily="34" charset="0"/>
+                <a:ea typeface="Calibri" panose="020F0502020204030204" pitchFamily="34" charset="0"/>
+                <a:cs typeface="Arial" panose="020B0604020202020204" pitchFamily="34" charset="0"/>
+              </a:rPr>
+              <a:t> 	</a:t>
+            </a:r>
+            <a:endParaRPr lang="en-US" b="0" dirty="0">
+              <a:solidFill>
+                <a:srgbClr val="000000"/>
+              </a:solidFill>
+              <a:ea typeface="Calibri" panose="020F0502020204030204" pitchFamily="34" charset="0"/>
+              <a:cs typeface="Arial" panose="020B0604020202020204" pitchFamily="34" charset="0"/>
+            </a:endParaRPr>
           </a:p>
           <a:p>
             <a:pPr marL="342900" lvl="0" indent="-342900">
               <a:buFont typeface="Arial" panose="020B0604020202020204" pitchFamily="34" charset="0"/>
               <a:buChar char="•"/>
             </a:pPr>
-            <a:r>
-              <a:rPr lang="en-GB" sz="2200" b="0" dirty="0"/>
-              <a:t>After reviewing the papers and gaps – what exactly is the problem? state this explicitly.</a:t>
-            </a:r>
             <a:endParaRPr lang="en-US" sz="2200" b="0" dirty="0"/>
+          </a:p>
+          <a:p>
+            <a:pPr marL="342900" lvl="0" indent="-342900">
+              <a:buFont typeface="Arial" panose="020B0604020202020204" pitchFamily="34" charset="0"/>
+              <a:buChar char="•"/>
+            </a:pPr>
+            <a:r>
+              <a:rPr lang="en-GB" sz="800" b="0" dirty="0"/>
+              <a:t>The research will in turn After reviewing the papers and gaps – what exactly is the problem? state this </a:t>
+            </a:r>
+            <a:r>
+              <a:rPr lang="en-GB" sz="800" b="0"/>
+              <a:t>explicitly.</a:t>
+            </a:r>
+          </a:p>
+          <a:p>
+            <a:pPr marL="342900" lvl="0" indent="-342900">
+              <a:buFont typeface="Arial" panose="020B0604020202020204" pitchFamily="34" charset="0"/>
+              <a:buChar char="•"/>
+            </a:pPr>
+            <a:endParaRPr lang="en-US" b="0" dirty="0"/>
           </a:p>
           <a:p>
             <a:pPr marL="342900" lvl="0" indent="-342900">
@@ -9704,14 +9803,14 @@
           <p:nvPr>
             <p:extLst>
               <p:ext uri="{D42A27DB-BD31-4B8C-83A1-F6EECF244321}">
-                <p14:modId xmlns:p14="http://schemas.microsoft.com/office/powerpoint/2010/main" val="1560470359"/>
+                <p14:modId xmlns:p14="http://schemas.microsoft.com/office/powerpoint/2010/main" val="490716619"/>
               </p:ext>
             </p:extLst>
           </p:nvPr>
         </p:nvGraphicFramePr>
         <p:xfrm>
           <a:off x="250824" y="4437112"/>
-          <a:ext cx="8640763" cy="2257374"/>
+          <a:ext cx="8640763" cy="2016075"/>
         </p:xfrm>
         <a:graphic>
           <a:graphicData uri="http://schemas.openxmlformats.org/drawingml/2006/table">
@@ -9742,7 +9841,7 @@
                   </a:extLst>
                 </a:gridCol>
               </a:tblGrid>
-              <a:tr h="402736">
+              <a:tr h="437792">
                 <a:tc>
                   <a:txBody>
                     <a:bodyPr/>
@@ -9788,7 +9887,7 @@
                   </a:ext>
                 </a:extLst>
               </a:tr>
-              <a:tr h="402736">
+              <a:tr h="437792">
                 <a:tc>
                   <a:txBody>
                     <a:bodyPr/>
@@ -9834,7 +9933,7 @@
                   </a:ext>
                 </a:extLst>
               </a:tr>
-              <a:tr h="402736">
+              <a:tr h="437792">
                 <a:tc>
                   <a:txBody>
                     <a:bodyPr/>
@@ -9880,7 +9979,7 @@
                   </a:ext>
                 </a:extLst>
               </a:tr>
-              <a:tr h="646430">
+              <a:tr h="702699">
                 <a:tc>
                   <a:txBody>
                     <a:bodyPr/>
@@ -9923,43 +10022,6 @@
                 <a:extLst>
                   <a:ext uri="{0D108BD9-81ED-4DB2-BD59-A6C34878D82A}">
                     <a16:rowId xmlns:a16="http://schemas.microsoft.com/office/drawing/2014/main" val="42632884"/>
-                  </a:ext>
-                </a:extLst>
-              </a:tr>
-              <a:tr h="402736">
-                <a:tc>
-                  <a:txBody>
-                    <a:bodyPr/>
-                    <a:lstStyle/>
-                    <a:p>
-                      <a:endParaRPr lang="en-US" dirty="0"/>
-                    </a:p>
-                  </a:txBody>
-                  <a:tcPr/>
-                </a:tc>
-                <a:tc>
-                  <a:txBody>
-                    <a:bodyPr/>
-                    <a:lstStyle/>
-                    <a:p>
-                      <a:endParaRPr lang="en-US" dirty="0"/>
-                    </a:p>
-                  </a:txBody>
-                  <a:tcPr/>
-                </a:tc>
-                <a:tc>
-                  <a:txBody>
-                    <a:bodyPr/>
-                    <a:lstStyle/>
-                    <a:p>
-                      <a:endParaRPr lang="en-US" dirty="0"/>
-                    </a:p>
-                  </a:txBody>
-                  <a:tcPr/>
-                </a:tc>
-                <a:extLst>
-                  <a:ext uri="{0D108BD9-81ED-4DB2-BD59-A6C34878D82A}">
-                    <a16:rowId xmlns:a16="http://schemas.microsoft.com/office/drawing/2014/main" val="213344512"/>
                   </a:ext>
                 </a:extLst>
               </a:tr>

</xml_diff>